<commit_message>
Jim's typos in L8.1-8.2
</commit_message>
<xml_diff>
--- a/Slides/Lesson 8.1 Introducing General Recursion.pptx
+++ b/Slides/Lesson 8.1 Introducing General Recursion.pptx
@@ -10,7 +10,7 @@
   <p:sldIdLst>
     <p:sldId id="257" r:id="rId2"/>
     <p:sldId id="325" r:id="rId3"/>
-    <p:sldId id="522" r:id="rId4"/>
+    <p:sldId id="541" r:id="rId4"/>
     <p:sldId id="536" r:id="rId5"/>
     <p:sldId id="307" r:id="rId6"/>
     <p:sldId id="308" r:id="rId7"/>
@@ -151,7 +151,7 @@
           <p14:sldIdLst>
             <p14:sldId id="257"/>
             <p14:sldId id="325"/>
-            <p14:sldId id="522"/>
+            <p14:sldId id="541"/>
             <p14:sldId id="536"/>
             <p14:sldId id="307"/>
             <p14:sldId id="308"/>
@@ -303,7 +303,7 @@
             <a:fld id="{CF8F25F6-E1EF-4065-8525-42EDEBD9BD22}" type="datetimeFigureOut">
               <a:rPr lang="en-US" smtClean="0"/>
               <a:pPr/>
-              <a:t>10/26/2015</a:t>
+              <a:t>10/27/2015</a:t>
             </a:fld>
             <a:endParaRPr lang="en-US"/>
           </a:p>
@@ -2813,7 +2813,7 @@
           <a:p>
             <a:fld id="{2F1F79F5-7BEC-496A-AFC7-876E38F64D71}" type="datetime1">
               <a:rPr lang="en-US" smtClean="0"/>
-              <a:t>10/26/2015</a:t>
+              <a:t>10/27/2015</a:t>
             </a:fld>
             <a:endParaRPr lang="en-US"/>
           </a:p>
@@ -2915,7 +2915,7 @@
           <a:p>
             <a:fld id="{0A05703A-7669-4FEA-9056-25299B4D29D4}" type="datetime1">
               <a:rPr lang="en-US" smtClean="0"/>
-              <a:t>10/26/2015</a:t>
+              <a:t>10/27/2015</a:t>
             </a:fld>
             <a:endParaRPr lang="en-US"/>
           </a:p>
@@ -3192,7 +3192,7 @@
           <a:p>
             <a:fld id="{6E5077B5-BB57-49DB-88CA-226A139E5C01}" type="datetime1">
               <a:rPr lang="en-US" smtClean="0"/>
-              <a:t>10/26/2015</a:t>
+              <a:t>10/27/2015</a:t>
             </a:fld>
             <a:endParaRPr lang="en-US"/>
           </a:p>
@@ -3445,7 +3445,7 @@
           <a:p>
             <a:fld id="{C48D9447-CBD6-49A1-89FD-8512A8CF8999}" type="datetime1">
               <a:rPr lang="en-US" smtClean="0"/>
-              <a:t>10/26/2015</a:t>
+              <a:t>10/27/2015</a:t>
             </a:fld>
             <a:endParaRPr lang="en-US"/>
           </a:p>
@@ -3615,7 +3615,7 @@
           <a:p>
             <a:fld id="{A3639A2A-823D-48B7-9ACE-7FAF42870BA9}" type="datetime1">
               <a:rPr lang="en-US" smtClean="0"/>
-              <a:t>10/26/2015</a:t>
+              <a:t>10/27/2015</a:t>
             </a:fld>
             <a:endParaRPr lang="en-US"/>
           </a:p>
@@ -3795,7 +3795,7 @@
           <a:p>
             <a:fld id="{ED1B6996-82E9-463C-972C-7B56056E426C}" type="datetime1">
               <a:rPr lang="en-US" smtClean="0"/>
-              <a:t>10/26/2015</a:t>
+              <a:t>10/27/2015</a:t>
             </a:fld>
             <a:endParaRPr lang="en-US"/>
           </a:p>
@@ -3971,7 +3971,7 @@
           <a:p>
             <a:fld id="{E22ED4DA-448D-4BB1-B935-CC112220207B}" type="datetime1">
               <a:rPr lang="en-US" smtClean="0"/>
-              <a:t>10/26/2015</a:t>
+              <a:t>10/27/2015</a:t>
             </a:fld>
             <a:endParaRPr lang="en-US"/>
           </a:p>
@@ -4153,7 +4153,7 @@
           <a:p>
             <a:fld id="{E22ED4DA-448D-4BB1-B935-CC112220207B}" type="datetime1">
               <a:rPr lang="en-US" smtClean="0"/>
-              <a:t>10/26/2015</a:t>
+              <a:t>10/27/2015</a:t>
             </a:fld>
             <a:endParaRPr lang="en-US"/>
           </a:p>
@@ -4422,7 +4422,7 @@
           <a:p>
             <a:fld id="{FF5D65A6-AB94-4435-B0B7-3743215FA46C}" type="datetime1">
               <a:rPr lang="en-US" smtClean="0"/>
-              <a:t>10/26/2015</a:t>
+              <a:t>10/27/2015</a:t>
             </a:fld>
             <a:endParaRPr lang="en-US"/>
           </a:p>
@@ -4607,7 +4607,7 @@
           <a:p>
             <a:fld id="{FF5D65A6-AB94-4435-B0B7-3743215FA46C}" type="datetime1">
               <a:rPr lang="en-US" smtClean="0"/>
-              <a:t>10/26/2015</a:t>
+              <a:t>10/27/2015</a:t>
             </a:fld>
             <a:endParaRPr lang="en-US"/>
           </a:p>
@@ -4909,7 +4909,7 @@
           <a:p>
             <a:fld id="{7C193DC4-6EF0-48C9-B29C-616106A645E1}" type="datetime1">
               <a:rPr lang="en-US" smtClean="0"/>
-              <a:t>10/26/2015</a:t>
+              <a:t>10/27/2015</a:t>
             </a:fld>
             <a:endParaRPr lang="en-US"/>
           </a:p>
@@ -5197,7 +5197,7 @@
           <a:p>
             <a:fld id="{5D1846AD-9252-4647-9435-4C2AC365653A}" type="datetime1">
               <a:rPr lang="en-US" smtClean="0"/>
-              <a:t>10/26/2015</a:t>
+              <a:t>10/27/2015</a:t>
             </a:fld>
             <a:endParaRPr lang="en-US"/>
           </a:p>
@@ -5619,7 +5619,7 @@
           <a:p>
             <a:fld id="{CE56DC10-3561-4063-A6AF-C1CC7A41040A}" type="datetime1">
               <a:rPr lang="en-US" smtClean="0"/>
-              <a:t>10/26/2015</a:t>
+              <a:t>10/27/2015</a:t>
             </a:fld>
             <a:endParaRPr lang="en-US"/>
           </a:p>
@@ -5737,7 +5737,7 @@
           <a:p>
             <a:fld id="{2F7B77F5-1464-4F6B-92A8-64FC8A508293}" type="datetime1">
               <a:rPr lang="en-US" smtClean="0"/>
-              <a:t>10/26/2015</a:t>
+              <a:t>10/27/2015</a:t>
             </a:fld>
             <a:endParaRPr lang="en-US"/>
           </a:p>
@@ -5969,7 +5969,7 @@
           <a:p>
             <a:fld id="{02B3F677-983B-48DB-ADFD-63FE6CBC7FB2}" type="datetime1">
               <a:rPr lang="en-US" smtClean="0"/>
-              <a:t>10/26/2015</a:t>
+              <a:t>10/27/2015</a:t>
             </a:fld>
             <a:endParaRPr lang="en-US"/>
           </a:p>
@@ -6568,7 +6568,6 @@
                 <a:rPr lang="en-US" sz="1000" dirty="0" smtClean="0"/>
                 <a:t>2012-2015</a:t>
               </a:r>
-              <a:endParaRPr lang="en-US" sz="1000" dirty="0" smtClean="0"/>
             </a:p>
             <a:p>
               <a:r>
@@ -8219,28 +8218,47 @@
                 <a:latin typeface="Consolas" pitchFamily="49" charset="0"/>
                 <a:cs typeface="Consolas" pitchFamily="49" charset="0"/>
               </a:rPr>
-              <a:t>;; Algorithm: if the </a:t>
+              <a:t>;; Algorithm: if the top level of the </a:t>
+            </a:r>
+            <a:r>
+              <a:rPr lang="en-US" b="1" dirty="0" err="1" smtClean="0">
+                <a:latin typeface="Consolas" pitchFamily="49" charset="0"/>
+                <a:cs typeface="Consolas" pitchFamily="49" charset="0"/>
+              </a:rPr>
+              <a:t>sexp</a:t>
             </a:r>
             <a:r>
               <a:rPr lang="en-US" b="1" dirty="0" smtClean="0">
                 <a:latin typeface="Consolas" pitchFamily="49" charset="0"/>
                 <a:cs typeface="Consolas" pitchFamily="49" charset="0"/>
               </a:rPr>
-              <a:t>top level of the </a:t>
+              <a:t> could be the top level of some</a:t>
+            </a:r>
+          </a:p>
+          <a:p>
+            <a:pPr>
+              <a:buNone/>
+            </a:pPr>
+            <a:r>
+              <a:rPr lang="en-US" b="1" dirty="0" smtClean="0">
+                <a:latin typeface="Consolas" pitchFamily="49" charset="0"/>
+                <a:cs typeface="Consolas" pitchFamily="49" charset="0"/>
+              </a:rPr>
+              <a:t>;;  </a:t>
             </a:r>
             <a:r>
               <a:rPr lang="en-US" b="1" dirty="0" err="1" smtClean="0">
                 <a:latin typeface="Consolas" pitchFamily="49" charset="0"/>
                 <a:cs typeface="Consolas" pitchFamily="49" charset="0"/>
               </a:rPr>
-              <a:t>sexp</a:t>
+              <a:t>diffexp</a:t>
             </a:r>
             <a:r>
               <a:rPr lang="en-US" b="1" dirty="0" smtClean="0">
                 <a:latin typeface="Consolas" pitchFamily="49" charset="0"/>
                 <a:cs typeface="Consolas" pitchFamily="49" charset="0"/>
               </a:rPr>
-              <a:t> could be the top level of some</a:t>
+              <a:t>, then recur, otherwise return false.  </a:t>
             </a:r>
           </a:p>
           <a:p>
@@ -8252,112 +8270,19 @@
                 <a:latin typeface="Consolas" pitchFamily="49" charset="0"/>
                 <a:cs typeface="Consolas" pitchFamily="49" charset="0"/>
               </a:rPr>
-              <a:t>;;  </a:t>
-            </a:r>
-            <a:r>
-              <a:rPr lang="en-US" b="1" dirty="0" err="1" smtClean="0">
-                <a:latin typeface="Consolas" pitchFamily="49" charset="0"/>
-                <a:cs typeface="Consolas" pitchFamily="49" charset="0"/>
-              </a:rPr>
-              <a:t>diffexp</a:t>
-            </a:r>
+              <a:t>;;  If either recursion fails, return false.  If both recursions succeed,</a:t>
+            </a:r>
+          </a:p>
+          <a:p>
+            <a:pPr>
+              <a:buNone/>
+            </a:pPr>
             <a:r>
               <a:rPr lang="en-US" b="1" dirty="0" smtClean="0">
                 <a:latin typeface="Consolas" pitchFamily="49" charset="0"/>
                 <a:cs typeface="Consolas" pitchFamily="49" charset="0"/>
               </a:rPr>
-              <a:t>, then </a:t>
-            </a:r>
-            <a:r>
-              <a:rPr lang="en-US" b="1" dirty="0" smtClean="0">
-                <a:latin typeface="Consolas" pitchFamily="49" charset="0"/>
-                <a:cs typeface="Consolas" pitchFamily="49" charset="0"/>
-              </a:rPr>
-              <a:t>recur</a:t>
-            </a:r>
-            <a:r>
-              <a:rPr lang="en-US" b="1" dirty="0" smtClean="0">
-                <a:latin typeface="Consolas" pitchFamily="49" charset="0"/>
-                <a:cs typeface="Consolas" pitchFamily="49" charset="0"/>
-              </a:rPr>
-              <a:t>, otherwise return false.  </a:t>
-            </a:r>
-            <a:endParaRPr lang="en-US" b="1" dirty="0" smtClean="0">
-              <a:latin typeface="Consolas" pitchFamily="49" charset="0"/>
-              <a:cs typeface="Consolas" pitchFamily="49" charset="0"/>
-            </a:endParaRPr>
-          </a:p>
-          <a:p>
-            <a:pPr>
-              <a:buNone/>
-            </a:pPr>
-            <a:r>
-              <a:rPr lang="en-US" b="1" dirty="0" smtClean="0">
-                <a:latin typeface="Consolas" pitchFamily="49" charset="0"/>
-                <a:cs typeface="Consolas" pitchFamily="49" charset="0"/>
-              </a:rPr>
-              <a:t>;;  </a:t>
-            </a:r>
-            <a:r>
-              <a:rPr lang="en-US" b="1" dirty="0" smtClean="0">
-                <a:latin typeface="Consolas" pitchFamily="49" charset="0"/>
-                <a:cs typeface="Consolas" pitchFamily="49" charset="0"/>
-              </a:rPr>
-              <a:t>If </a:t>
-            </a:r>
-            <a:r>
-              <a:rPr lang="en-US" b="1" dirty="0" smtClean="0">
-                <a:latin typeface="Consolas" pitchFamily="49" charset="0"/>
-                <a:cs typeface="Consolas" pitchFamily="49" charset="0"/>
-              </a:rPr>
-              <a:t>either recursion fails, </a:t>
-            </a:r>
-            <a:r>
-              <a:rPr lang="en-US" b="1" dirty="0" smtClean="0">
-                <a:latin typeface="Consolas" pitchFamily="49" charset="0"/>
-                <a:cs typeface="Consolas" pitchFamily="49" charset="0"/>
-              </a:rPr>
-              <a:t>return false</a:t>
-            </a:r>
-            <a:r>
-              <a:rPr lang="en-US" b="1" dirty="0" smtClean="0">
-                <a:latin typeface="Consolas" pitchFamily="49" charset="0"/>
-                <a:cs typeface="Consolas" pitchFamily="49" charset="0"/>
-              </a:rPr>
-              <a:t>.  If both recursions succeed</a:t>
-            </a:r>
-            <a:r>
-              <a:rPr lang="en-US" b="1" dirty="0" smtClean="0">
-                <a:latin typeface="Consolas" pitchFamily="49" charset="0"/>
-                <a:cs typeface="Consolas" pitchFamily="49" charset="0"/>
-              </a:rPr>
-              <a:t>,</a:t>
-            </a:r>
-          </a:p>
-          <a:p>
-            <a:pPr>
-              <a:buNone/>
-            </a:pPr>
-            <a:r>
-              <a:rPr lang="en-US" b="1" dirty="0" smtClean="0">
-                <a:latin typeface="Consolas" pitchFamily="49" charset="0"/>
-                <a:cs typeface="Consolas" pitchFamily="49" charset="0"/>
-              </a:rPr>
-              <a:t>;; </a:t>
-            </a:r>
-            <a:r>
-              <a:rPr lang="en-US" b="1" dirty="0" smtClean="0">
-                <a:latin typeface="Consolas" pitchFamily="49" charset="0"/>
-                <a:cs typeface="Consolas" pitchFamily="49" charset="0"/>
-              </a:rPr>
-              <a:t> </a:t>
-            </a:r>
-            <a:r>
-              <a:rPr lang="en-US" b="1" dirty="0" smtClean="0">
-                <a:latin typeface="Consolas" pitchFamily="49" charset="0"/>
-                <a:cs typeface="Consolas" pitchFamily="49" charset="0"/>
-              </a:rPr>
-              <a:t>return the </a:t>
+              <a:t>;;  return the </a:t>
             </a:r>
             <a:r>
               <a:rPr lang="en-US" b="1" dirty="0" err="1" smtClean="0">
@@ -8972,14 +8897,7 @@
                 <a:latin typeface="Consolas" pitchFamily="49" charset="0"/>
                 <a:cs typeface="Consolas" pitchFamily="49" charset="0"/>
               </a:rPr>
-              <a:t>;; </a:t>
-            </a:r>
-            <a:r>
-              <a:rPr lang="en-US" b="1" dirty="0" smtClean="0">
-                <a:latin typeface="Consolas" pitchFamily="49" charset="0"/>
-                <a:cs typeface="Consolas" pitchFamily="49" charset="0"/>
-              </a:rPr>
-              <a:t>At the top level, a representation of a </a:t>
+              <a:t>;; At the top level, a representation of a </a:t>
             </a:r>
           </a:p>
           <a:p>
@@ -10156,11 +10074,7 @@
           <a:p>
             <a:r>
               <a:rPr lang="en-US" dirty="0" smtClean="0"/>
-              <a:t>Pattern </a:t>
-            </a:r>
-            <a:r>
-              <a:rPr lang="en-US" dirty="0" smtClean="0"/>
-              <a:t>for General Recursion (1)</a:t>
+              <a:t>Pattern for General Recursion (1)</a:t>
             </a:r>
             <a:endParaRPr lang="en-US" dirty="0"/>
           </a:p>
@@ -10823,11 +10737,7 @@
           <a:p>
             <a:r>
               <a:rPr lang="en-US" dirty="0" smtClean="0"/>
-              <a:t>We'll introduce </a:t>
-            </a:r>
-            <a:r>
-              <a:rPr lang="en-US" dirty="0" smtClean="0"/>
-              <a:t>a new family of strategies, called </a:t>
+              <a:t>We'll introduce a new family of strategies, called </a:t>
             </a:r>
             <a:r>
               <a:rPr lang="en-US" i="1" dirty="0" smtClean="0">
@@ -10845,11 +10755,7 @@
           <a:p>
             <a:r>
               <a:rPr lang="en-US" dirty="0" smtClean="0"/>
-              <a:t>General </a:t>
-            </a:r>
-            <a:r>
-              <a:rPr lang="en-US" dirty="0" smtClean="0"/>
-              <a:t>recursion and invariants together provide a powerful combination.</a:t>
+              <a:t>General recursion and invariants together provide a powerful combination.</a:t>
             </a:r>
           </a:p>
           <a:p>
@@ -10937,11 +10843,7 @@
           <a:p>
             <a:r>
               <a:rPr lang="en-US" dirty="0" smtClean="0"/>
-              <a:t>There's more than one </a:t>
-            </a:r>
-            <a:r>
-              <a:rPr lang="en-US" dirty="0" smtClean="0"/>
-              <a:t>pattern</a:t>
+              <a:t>There's more than one pattern</a:t>
             </a:r>
             <a:endParaRPr lang="en-US" dirty="0"/>
           </a:p>
@@ -11634,11 +11536,7 @@
           <a:p>
             <a:r>
               <a:rPr lang="en-US" dirty="0" smtClean="0"/>
-              <a:t>Another General-Recursion </a:t>
-            </a:r>
-            <a:r>
-              <a:rPr lang="en-US" dirty="0" smtClean="0"/>
-              <a:t>Pattern</a:t>
+              <a:t>Another General-Recursion Pattern</a:t>
             </a:r>
             <a:endParaRPr lang="en-US" dirty="0"/>
           </a:p>
@@ -11729,11 +11627,7 @@
           <a:p>
             <a:r>
               <a:rPr lang="en-US" dirty="0" smtClean="0"/>
-              <a:t>Most of our functions involving lists match this </a:t>
-            </a:r>
-            <a:r>
-              <a:rPr lang="en-US" dirty="0" smtClean="0"/>
-              <a:t>pattern.</a:t>
+              <a:t>Most of our functions involving lists match this pattern.</a:t>
             </a:r>
             <a:endParaRPr lang="en-US" dirty="0"/>
           </a:p>
@@ -11764,14 +11658,7 @@
                 <a:latin typeface="Consolas" pitchFamily="49" charset="0"/>
                 <a:cs typeface="Consolas" pitchFamily="49" charset="0"/>
               </a:rPr>
-              <a:t>;; solve : Problem -&gt; </a:t>
-            </a:r>
-            <a:r>
-              <a:rPr lang="en-US" sz="5500" b="1" dirty="0" smtClean="0">
-                <a:latin typeface="Consolas" pitchFamily="49" charset="0"/>
-                <a:cs typeface="Consolas" pitchFamily="49" charset="0"/>
-              </a:rPr>
-              <a:t>Solution</a:t>
+              <a:t>;; solve : Problem -&gt; Solution</a:t>
             </a:r>
           </a:p>
           <a:p>
@@ -11805,17 +11692,7 @@
                 <a:latin typeface="Consolas" pitchFamily="49" charset="0"/>
                 <a:cs typeface="Consolas" pitchFamily="49" charset="0"/>
               </a:rPr>
-              <a:t> </a:t>
-            </a:r>
-            <a:r>
-              <a:rPr lang="en-US" sz="5500" b="1" i="1" dirty="0" smtClean="0">
-                <a:solidFill>
-                  <a:schemeClr val="bg1"/>
-                </a:solidFill>
-                <a:latin typeface="Consolas" pitchFamily="49" charset="0"/>
-                <a:cs typeface="Consolas" pitchFamily="49" charset="0"/>
-              </a:rPr>
-              <a:t>ARGUMENT: explain why new-problem1 and new-problem2 are easier than the-problem.</a:t>
+              <a:t> ARGUMENT: explain why new-problem1 and new-problem2 are easier than the-problem.</a:t>
             </a:r>
           </a:p>
           <a:p>
@@ -12176,11 +12053,7 @@
           <a:p>
             <a:r>
               <a:rPr lang="en-US" dirty="0" smtClean="0"/>
-              <a:t>Yet Another General-Recursion </a:t>
-            </a:r>
-            <a:r>
-              <a:rPr lang="en-US" dirty="0" smtClean="0"/>
-              <a:t>Pattern</a:t>
+              <a:t>Yet Another General-Recursion Pattern</a:t>
             </a:r>
             <a:endParaRPr lang="en-US" dirty="0"/>
           </a:p>
@@ -12211,14 +12084,7 @@
                 <a:latin typeface="Consolas" pitchFamily="49" charset="0"/>
                 <a:cs typeface="Consolas" pitchFamily="49" charset="0"/>
               </a:rPr>
-              <a:t>;; solve : Problem -&gt; </a:t>
-            </a:r>
-            <a:r>
-              <a:rPr lang="en-US" sz="5500" b="1" dirty="0" smtClean="0">
-                <a:latin typeface="Consolas" pitchFamily="49" charset="0"/>
-                <a:cs typeface="Consolas" pitchFamily="49" charset="0"/>
-              </a:rPr>
-              <a:t>Solution</a:t>
+              <a:t>;; solve : Problem -&gt; Solution</a:t>
             </a:r>
           </a:p>
           <a:p>
@@ -12771,7 +12637,19 @@
           <a:p>
             <a:r>
               <a:rPr lang="en-US" dirty="0" smtClean="0"/>
-              <a:t>Here's a version with where the difficult case requires solving a whole list of </a:t>
+              <a:t>Here's </a:t>
+            </a:r>
+            <a:r>
+              <a:rPr lang="en-US" smtClean="0"/>
+              <a:t>a </a:t>
+            </a:r>
+            <a:r>
+              <a:rPr lang="en-US" smtClean="0"/>
+              <a:t>version </a:t>
+            </a:r>
+            <a:r>
+              <a:rPr lang="en-US" dirty="0" smtClean="0"/>
+              <a:t>where the difficult case requires solving a whole list of </a:t>
             </a:r>
             <a:r>
               <a:rPr lang="en-US" dirty="0" err="1" smtClean="0"/>
@@ -12779,11 +12657,7 @@
             </a:r>
             <a:r>
               <a:rPr lang="en-US" dirty="0" smtClean="0"/>
-              <a:t>.  A tree where a node has a list of sons may lead to use of this </a:t>
-            </a:r>
-            <a:r>
-              <a:rPr lang="en-US" dirty="0" smtClean="0"/>
-              <a:t>pattern.</a:t>
+              <a:t>.  A tree where a node has a list of sons may lead to use of this pattern.</a:t>
             </a:r>
             <a:endParaRPr lang="en-US" dirty="0"/>
           </a:p>
@@ -13273,23 +13147,7 @@
                   <a:schemeClr val="tx1"/>
                 </a:solidFill>
               </a:rPr>
-              <a:t> </a:t>
-            </a:r>
-            <a:r>
-              <a:rPr lang="en-US" dirty="0" smtClean="0">
-                <a:solidFill>
-                  <a:schemeClr val="tx1"/>
-                </a:solidFill>
-              </a:rPr>
-              <a:t>pattern we </a:t>
-            </a:r>
-            <a:r>
-              <a:rPr lang="en-US" dirty="0" smtClean="0">
-                <a:solidFill>
-                  <a:schemeClr val="tx1"/>
-                </a:solidFill>
-              </a:rPr>
-              <a:t>saw a couple of slides ago, but done without the local </a:t>
+              <a:t> pattern we saw a couple of slides ago, but done without the local </a:t>
             </a:r>
             <a:r>
               <a:rPr lang="en-US" b="1" dirty="0" smtClean="0">
@@ -13371,11 +13229,7 @@
           <a:p>
             <a:r>
               <a:rPr lang="en-US" dirty="0" smtClean="0"/>
-              <a:t>Yet Another General-Recursion </a:t>
-            </a:r>
-            <a:r>
-              <a:rPr lang="en-US" dirty="0" smtClean="0"/>
-              <a:t>Pattern</a:t>
+              <a:t>Yet Another General-Recursion Pattern</a:t>
             </a:r>
             <a:endParaRPr lang="en-US" dirty="0"/>
           </a:p>
@@ -13862,15 +13716,7 @@
             </a:r>
             <a:r>
               <a:rPr lang="en-US" dirty="0" smtClean="0"/>
-              <a:t> </a:t>
-            </a:r>
-            <a:r>
-              <a:rPr lang="en-US" dirty="0" smtClean="0"/>
-              <a:t>pattern done </a:t>
-            </a:r>
-            <a:r>
-              <a:rPr lang="en-US" dirty="0" smtClean="0"/>
-              <a:t>without using local </a:t>
+              <a:t> pattern done without using local </a:t>
             </a:r>
             <a:r>
               <a:rPr lang="en-US" b="1" dirty="0" smtClean="0"/>
@@ -13940,15 +13786,7 @@
           <a:p>
             <a:r>
               <a:rPr lang="en-US" dirty="0" smtClean="0"/>
-              <a:t>What </a:t>
-            </a:r>
-            <a:r>
-              <a:rPr lang="en-US" dirty="0" smtClean="0"/>
-              <a:t>pattern did </a:t>
-            </a:r>
-            <a:r>
-              <a:rPr lang="en-US" dirty="0" smtClean="0"/>
-              <a:t>we use for decode?</a:t>
+              <a:t>What pattern did we use for decode?</a:t>
             </a:r>
             <a:endParaRPr lang="en-US" dirty="0"/>
           </a:p>
@@ -13978,15 +13816,7 @@
             </a:pPr>
             <a:r>
               <a:rPr lang="en-US" sz="1800" dirty="0" smtClean="0"/>
-              <a:t>;; decode followed the first </a:t>
-            </a:r>
-            <a:r>
-              <a:rPr lang="en-US" sz="1800" dirty="0" smtClean="0"/>
-              <a:t>pattern we </a:t>
-            </a:r>
-            <a:r>
-              <a:rPr lang="en-US" sz="1800" dirty="0" smtClean="0"/>
-              <a:t>wrote:</a:t>
+              <a:t>;; decode followed the first pattern we wrote:</a:t>
             </a:r>
           </a:p>
           <a:p>
@@ -15520,17 +15350,19 @@
             </a:prstGeom>
           </p:spPr>
           <p:style>
-            <a:lnRef idx="1">
-              <a:schemeClr val="accent2"/>
+            <a:lnRef idx="2">
+              <a:schemeClr val="accent2">
+                <a:shade val="50000"/>
+              </a:schemeClr>
             </a:lnRef>
-            <a:fillRef idx="2">
+            <a:fillRef idx="1">
               <a:schemeClr val="accent2"/>
             </a:fillRef>
-            <a:effectRef idx="1">
+            <a:effectRef idx="0">
               <a:schemeClr val="accent2"/>
             </a:effectRef>
             <a:fontRef idx="minor">
-              <a:schemeClr val="dk1"/>
+              <a:schemeClr val="lt1"/>
             </a:fontRef>
           </p:style>
           <p:txBody>
@@ -15695,443 +15527,6 @@
             <a:xfrm>
               <a:off x="1390650" y="3097870"/>
               <a:ext cx="0" cy="273283"/>
-            </a:xfrm>
-            <a:prstGeom prst="straightConnector1">
-              <a:avLst/>
-            </a:prstGeom>
-            <a:ln>
-              <a:tailEnd type="triangle"/>
-            </a:ln>
-          </p:spPr>
-          <p:style>
-            <a:lnRef idx="1">
-              <a:schemeClr val="accent1"/>
-            </a:lnRef>
-            <a:fillRef idx="0">
-              <a:schemeClr val="accent1"/>
-            </a:fillRef>
-            <a:effectRef idx="0">
-              <a:schemeClr val="accent1"/>
-            </a:effectRef>
-            <a:fontRef idx="minor">
-              <a:schemeClr val="tx1"/>
-            </a:fontRef>
-          </p:style>
-        </p:cxnSp>
-      </p:grpSp>
-      <p:grpSp>
-        <p:nvGrpSpPr>
-          <p:cNvPr id="80" name="Group 79"/>
-          <p:cNvGrpSpPr/>
-          <p:nvPr/>
-        </p:nvGrpSpPr>
-        <p:grpSpPr>
-          <a:xfrm>
-            <a:off x="3657600" y="951104"/>
-            <a:ext cx="1828800" cy="5373496"/>
-            <a:chOff x="2598691" y="951104"/>
-            <a:chExt cx="1828800" cy="5373496"/>
-          </a:xfrm>
-        </p:grpSpPr>
-        <p:sp>
-          <p:nvSpPr>
-            <p:cNvPr id="6" name="Rounded Rectangle 5"/>
-            <p:cNvSpPr/>
-            <p:nvPr/>
-          </p:nvSpPr>
-          <p:spPr>
-            <a:xfrm>
-              <a:off x="2598691" y="951104"/>
-              <a:ext cx="1828800" cy="533400"/>
-            </a:xfrm>
-            <a:prstGeom prst="roundRect">
-              <a:avLst/>
-            </a:prstGeom>
-          </p:spPr>
-          <p:style>
-            <a:lnRef idx="0">
-              <a:schemeClr val="accent1"/>
-            </a:lnRef>
-            <a:fillRef idx="3">
-              <a:schemeClr val="accent1"/>
-            </a:fillRef>
-            <a:effectRef idx="3">
-              <a:schemeClr val="accent1"/>
-            </a:effectRef>
-            <a:fontRef idx="minor">
-              <a:schemeClr val="lt1"/>
-            </a:fontRef>
-          </p:style>
-          <p:txBody>
-            <a:bodyPr rtlCol="0" anchor="ctr"/>
-            <a:lstStyle/>
-            <a:p>
-              <a:pPr algn="ctr"/>
-              <a:r>
-                <a:rPr lang="en-US" dirty="0" smtClean="0"/>
-                <a:t>Design Strategies</a:t>
-              </a:r>
-              <a:endParaRPr lang="en-US" dirty="0"/>
-            </a:p>
-          </p:txBody>
-        </p:sp>
-        <p:sp>
-          <p:nvSpPr>
-            <p:cNvPr id="13" name="Rounded Rectangle 12"/>
-            <p:cNvSpPr/>
-            <p:nvPr/>
-          </p:nvSpPr>
-          <p:spPr>
-            <a:xfrm>
-              <a:off x="2598691" y="1757787"/>
-              <a:ext cx="1828800" cy="533400"/>
-            </a:xfrm>
-            <a:prstGeom prst="roundRect">
-              <a:avLst/>
-            </a:prstGeom>
-            <a:solidFill>
-              <a:schemeClr val="accent1">
-                <a:lumMod val="20000"/>
-                <a:lumOff val="80000"/>
-              </a:schemeClr>
-            </a:solidFill>
-          </p:spPr>
-          <p:style>
-            <a:lnRef idx="1">
-              <a:schemeClr val="accent1"/>
-            </a:lnRef>
-            <a:fillRef idx="2">
-              <a:schemeClr val="accent1"/>
-            </a:fillRef>
-            <a:effectRef idx="1">
-              <a:schemeClr val="accent1"/>
-            </a:effectRef>
-            <a:fontRef idx="minor">
-              <a:schemeClr val="dk1"/>
-            </a:fontRef>
-          </p:style>
-          <p:txBody>
-            <a:bodyPr rtlCol="0" anchor="ctr"/>
-            <a:lstStyle/>
-            <a:p>
-              <a:pPr algn="ctr"/>
-              <a:r>
-                <a:rPr lang="en-US" dirty="0" smtClean="0"/>
-                <a:t>Combine simpler functions</a:t>
-              </a:r>
-              <a:endParaRPr lang="en-US" dirty="0"/>
-            </a:p>
-          </p:txBody>
-        </p:sp>
-        <p:sp>
-          <p:nvSpPr>
-            <p:cNvPr id="23" name="Rounded Rectangle 22"/>
-            <p:cNvSpPr/>
-            <p:nvPr/>
-          </p:nvSpPr>
-          <p:spPr>
-            <a:xfrm>
-              <a:off x="2598691" y="2766140"/>
-              <a:ext cx="1828800" cy="533400"/>
-            </a:xfrm>
-            <a:prstGeom prst="roundRect">
-              <a:avLst/>
-            </a:prstGeom>
-          </p:spPr>
-          <p:style>
-            <a:lnRef idx="2">
-              <a:schemeClr val="accent2">
-                <a:shade val="50000"/>
-              </a:schemeClr>
-            </a:lnRef>
-            <a:fillRef idx="1">
-              <a:schemeClr val="accent2"/>
-            </a:fillRef>
-            <a:effectRef idx="0">
-              <a:schemeClr val="accent2"/>
-            </a:effectRef>
-            <a:fontRef idx="minor">
-              <a:schemeClr val="lt1"/>
-            </a:fontRef>
-          </p:style>
-          <p:txBody>
-            <a:bodyPr rtlCol="0" anchor="ctr"/>
-            <a:lstStyle/>
-            <a:p>
-              <a:pPr algn="ctr"/>
-              <a:r>
-                <a:rPr lang="en-US" dirty="0" smtClean="0"/>
-                <a:t>Use a template</a:t>
-              </a:r>
-              <a:endParaRPr lang="en-US" dirty="0"/>
-            </a:p>
-          </p:txBody>
-        </p:sp>
-        <p:sp>
-          <p:nvSpPr>
-            <p:cNvPr id="28" name="Rounded Rectangle 27"/>
-            <p:cNvSpPr/>
-            <p:nvPr/>
-          </p:nvSpPr>
-          <p:spPr>
-            <a:xfrm>
-              <a:off x="2598691" y="3774493"/>
-              <a:ext cx="1828800" cy="533400"/>
-            </a:xfrm>
-            <a:prstGeom prst="roundRect">
-              <a:avLst/>
-            </a:prstGeom>
-            <a:solidFill>
-              <a:schemeClr val="accent1">
-                <a:lumMod val="20000"/>
-                <a:lumOff val="80000"/>
-              </a:schemeClr>
-            </a:solidFill>
-          </p:spPr>
-          <p:style>
-            <a:lnRef idx="1">
-              <a:schemeClr val="accent1"/>
-            </a:lnRef>
-            <a:fillRef idx="2">
-              <a:schemeClr val="accent1"/>
-            </a:fillRef>
-            <a:effectRef idx="1">
-              <a:schemeClr val="accent1"/>
-            </a:effectRef>
-            <a:fontRef idx="minor">
-              <a:schemeClr val="dk1"/>
-            </a:fontRef>
-          </p:style>
-          <p:txBody>
-            <a:bodyPr rtlCol="0" anchor="ctr"/>
-            <a:lstStyle/>
-            <a:p>
-              <a:pPr algn="ctr"/>
-              <a:r>
-                <a:rPr lang="en-US" dirty="0" smtClean="0"/>
-                <a:t>Divide into Cases</a:t>
-              </a:r>
-              <a:endParaRPr lang="en-US" dirty="0"/>
-            </a:p>
-          </p:txBody>
-        </p:sp>
-        <p:sp>
-          <p:nvSpPr>
-            <p:cNvPr id="38" name="Rounded Rectangle 37"/>
-            <p:cNvSpPr/>
-            <p:nvPr/>
-          </p:nvSpPr>
-          <p:spPr>
-            <a:xfrm>
-              <a:off x="2598691" y="4782846"/>
-              <a:ext cx="1828800" cy="533400"/>
-            </a:xfrm>
-            <a:prstGeom prst="roundRect">
-              <a:avLst/>
-            </a:prstGeom>
-            <a:solidFill>
-              <a:schemeClr val="accent1">
-                <a:lumMod val="20000"/>
-                <a:lumOff val="80000"/>
-              </a:schemeClr>
-            </a:solidFill>
-          </p:spPr>
-          <p:style>
-            <a:lnRef idx="1">
-              <a:schemeClr val="accent1"/>
-            </a:lnRef>
-            <a:fillRef idx="2">
-              <a:schemeClr val="accent1"/>
-            </a:fillRef>
-            <a:effectRef idx="1">
-              <a:schemeClr val="accent1"/>
-            </a:effectRef>
-            <a:fontRef idx="minor">
-              <a:schemeClr val="dk1"/>
-            </a:fontRef>
-          </p:style>
-          <p:txBody>
-            <a:bodyPr rtlCol="0" anchor="ctr"/>
-            <a:lstStyle/>
-            <a:p>
-              <a:pPr algn="ctr"/>
-              <a:r>
-                <a:rPr lang="en-US" dirty="0" smtClean="0"/>
-                <a:t>Call a more general function</a:t>
-              </a:r>
-              <a:endParaRPr lang="en-US" dirty="0"/>
-            </a:p>
-          </p:txBody>
-        </p:sp>
-        <p:sp>
-          <p:nvSpPr>
-            <p:cNvPr id="48" name="Rounded Rectangle 47"/>
-            <p:cNvSpPr/>
-            <p:nvPr/>
-          </p:nvSpPr>
-          <p:spPr>
-            <a:xfrm>
-              <a:off x="2598691" y="5791200"/>
-              <a:ext cx="1828800" cy="533400"/>
-            </a:xfrm>
-            <a:prstGeom prst="roundRect">
-              <a:avLst/>
-            </a:prstGeom>
-            <a:solidFill>
-              <a:schemeClr val="accent1">
-                <a:lumMod val="20000"/>
-                <a:lumOff val="80000"/>
-              </a:schemeClr>
-            </a:solidFill>
-          </p:spPr>
-          <p:style>
-            <a:lnRef idx="1">
-              <a:schemeClr val="accent1"/>
-            </a:lnRef>
-            <a:fillRef idx="2">
-              <a:schemeClr val="accent1"/>
-            </a:fillRef>
-            <a:effectRef idx="1">
-              <a:schemeClr val="accent1"/>
-            </a:effectRef>
-            <a:fontRef idx="minor">
-              <a:schemeClr val="dk1"/>
-            </a:fontRef>
-          </p:style>
-          <p:txBody>
-            <a:bodyPr rtlCol="0" anchor="ctr"/>
-            <a:lstStyle/>
-            <a:p>
-              <a:pPr algn="ctr"/>
-              <a:r>
-                <a:rPr lang="en-US" dirty="0" smtClean="0"/>
-                <a:t>Communicate via State</a:t>
-              </a:r>
-              <a:endParaRPr lang="en-US" dirty="0"/>
-            </a:p>
-          </p:txBody>
-        </p:sp>
-        <p:cxnSp>
-          <p:nvCxnSpPr>
-            <p:cNvPr id="70" name="Straight Arrow Connector 69"/>
-            <p:cNvCxnSpPr>
-              <a:stCxn id="13" idx="2"/>
-              <a:endCxn id="23" idx="0"/>
-            </p:cNvCxnSpPr>
-            <p:nvPr/>
-          </p:nvCxnSpPr>
-          <p:spPr>
-            <a:xfrm>
-              <a:off x="3513091" y="2291187"/>
-              <a:ext cx="0" cy="474953"/>
-            </a:xfrm>
-            <a:prstGeom prst="straightConnector1">
-              <a:avLst/>
-            </a:prstGeom>
-            <a:ln>
-              <a:tailEnd type="triangle"/>
-            </a:ln>
-          </p:spPr>
-          <p:style>
-            <a:lnRef idx="1">
-              <a:schemeClr val="accent1"/>
-            </a:lnRef>
-            <a:fillRef idx="0">
-              <a:schemeClr val="accent1"/>
-            </a:fillRef>
-            <a:effectRef idx="0">
-              <a:schemeClr val="accent1"/>
-            </a:effectRef>
-            <a:fontRef idx="minor">
-              <a:schemeClr val="tx1"/>
-            </a:fontRef>
-          </p:style>
-        </p:cxnSp>
-        <p:cxnSp>
-          <p:nvCxnSpPr>
-            <p:cNvPr id="72" name="Straight Arrow Connector 71"/>
-            <p:cNvCxnSpPr>
-              <a:stCxn id="23" idx="2"/>
-              <a:endCxn id="28" idx="0"/>
-            </p:cNvCxnSpPr>
-            <p:nvPr/>
-          </p:nvCxnSpPr>
-          <p:spPr>
-            <a:xfrm>
-              <a:off x="3513091" y="3299540"/>
-              <a:ext cx="0" cy="474953"/>
-            </a:xfrm>
-            <a:prstGeom prst="straightConnector1">
-              <a:avLst/>
-            </a:prstGeom>
-            <a:ln>
-              <a:tailEnd type="triangle"/>
-            </a:ln>
-          </p:spPr>
-          <p:style>
-            <a:lnRef idx="1">
-              <a:schemeClr val="accent1"/>
-            </a:lnRef>
-            <a:fillRef idx="0">
-              <a:schemeClr val="accent1"/>
-            </a:fillRef>
-            <a:effectRef idx="0">
-              <a:schemeClr val="accent1"/>
-            </a:effectRef>
-            <a:fontRef idx="minor">
-              <a:schemeClr val="tx1"/>
-            </a:fontRef>
-          </p:style>
-        </p:cxnSp>
-        <p:cxnSp>
-          <p:nvCxnSpPr>
-            <p:cNvPr id="74" name="Straight Arrow Connector 73"/>
-            <p:cNvCxnSpPr>
-              <a:stCxn id="28" idx="2"/>
-              <a:endCxn id="38" idx="0"/>
-            </p:cNvCxnSpPr>
-            <p:nvPr/>
-          </p:nvCxnSpPr>
-          <p:spPr>
-            <a:xfrm>
-              <a:off x="3513091" y="4307893"/>
-              <a:ext cx="0" cy="474953"/>
-            </a:xfrm>
-            <a:prstGeom prst="straightConnector1">
-              <a:avLst/>
-            </a:prstGeom>
-            <a:ln>
-              <a:tailEnd type="triangle"/>
-            </a:ln>
-          </p:spPr>
-          <p:style>
-            <a:lnRef idx="1">
-              <a:schemeClr val="accent1"/>
-            </a:lnRef>
-            <a:fillRef idx="0">
-              <a:schemeClr val="accent1"/>
-            </a:fillRef>
-            <a:effectRef idx="0">
-              <a:schemeClr val="accent1"/>
-            </a:effectRef>
-            <a:fontRef idx="minor">
-              <a:schemeClr val="tx1"/>
-            </a:fontRef>
-          </p:style>
-        </p:cxnSp>
-        <p:cxnSp>
-          <p:nvCxnSpPr>
-            <p:cNvPr id="77" name="Straight Arrow Connector 76"/>
-            <p:cNvCxnSpPr>
-              <a:stCxn id="38" idx="2"/>
-              <a:endCxn id="48" idx="0"/>
-            </p:cNvCxnSpPr>
-            <p:nvPr/>
-          </p:nvCxnSpPr>
-          <p:spPr>
-            <a:xfrm>
-              <a:off x="3513091" y="5316246"/>
-              <a:ext cx="0" cy="474954"/>
             </a:xfrm>
             <a:prstGeom prst="straightConnector1">
               <a:avLst/>
@@ -16512,8 +15907,8 @@
         </p:nvCxnSpPr>
         <p:spPr>
           <a:xfrm flipV="1">
-            <a:off x="5486400" y="2024487"/>
-            <a:ext cx="914400" cy="3025059"/>
+            <a:off x="5486398" y="2024487"/>
+            <a:ext cx="914402" cy="2410424"/>
           </a:xfrm>
           <a:prstGeom prst="bentConnector3">
             <a:avLst>
@@ -16562,10 +15957,535 @@
           </a:p>
         </p:txBody>
       </p:sp>
+      <p:grpSp>
+        <p:nvGrpSpPr>
+          <p:cNvPr id="24" name="Group 23"/>
+          <p:cNvGrpSpPr/>
+          <p:nvPr/>
+        </p:nvGrpSpPr>
+        <p:grpSpPr>
+          <a:xfrm>
+            <a:off x="3657598" y="941479"/>
+            <a:ext cx="1832811" cy="5373496"/>
+            <a:chOff x="3657598" y="941479"/>
+            <a:chExt cx="1832811" cy="5373496"/>
+          </a:xfrm>
+        </p:grpSpPr>
+        <p:sp>
+          <p:nvSpPr>
+            <p:cNvPr id="6" name="Rounded Rectangle 5"/>
+            <p:cNvSpPr/>
+            <p:nvPr/>
+          </p:nvSpPr>
+          <p:spPr>
+            <a:xfrm>
+              <a:off x="3657599" y="941479"/>
+              <a:ext cx="1828800" cy="533400"/>
+            </a:xfrm>
+            <a:prstGeom prst="roundRect">
+              <a:avLst/>
+            </a:prstGeom>
+          </p:spPr>
+          <p:style>
+            <a:lnRef idx="0">
+              <a:schemeClr val="accent1"/>
+            </a:lnRef>
+            <a:fillRef idx="3">
+              <a:schemeClr val="accent1"/>
+            </a:fillRef>
+            <a:effectRef idx="3">
+              <a:schemeClr val="accent1"/>
+            </a:effectRef>
+            <a:fontRef idx="minor">
+              <a:schemeClr val="lt1"/>
+            </a:fontRef>
+          </p:style>
+          <p:txBody>
+            <a:bodyPr rtlCol="0" anchor="ctr"/>
+            <a:lstStyle/>
+            <a:p>
+              <a:pPr algn="ctr"/>
+              <a:r>
+                <a:rPr lang="en-US" dirty="0" smtClean="0"/>
+                <a:t>Design Strategies</a:t>
+              </a:r>
+              <a:endParaRPr lang="en-US" dirty="0"/>
+            </a:p>
+          </p:txBody>
+        </p:sp>
+        <p:sp>
+          <p:nvSpPr>
+            <p:cNvPr id="13" name="Rounded Rectangle 12"/>
+            <p:cNvSpPr/>
+            <p:nvPr/>
+          </p:nvSpPr>
+          <p:spPr>
+            <a:xfrm>
+              <a:off x="3657599" y="1748162"/>
+              <a:ext cx="1828800" cy="533400"/>
+            </a:xfrm>
+            <a:prstGeom prst="roundRect">
+              <a:avLst/>
+            </a:prstGeom>
+            <a:solidFill>
+              <a:schemeClr val="accent1">
+                <a:lumMod val="20000"/>
+                <a:lumOff val="80000"/>
+              </a:schemeClr>
+            </a:solidFill>
+          </p:spPr>
+          <p:style>
+            <a:lnRef idx="1">
+              <a:schemeClr val="accent1"/>
+            </a:lnRef>
+            <a:fillRef idx="2">
+              <a:schemeClr val="accent1"/>
+            </a:fillRef>
+            <a:effectRef idx="1">
+              <a:schemeClr val="accent1"/>
+            </a:effectRef>
+            <a:fontRef idx="minor">
+              <a:schemeClr val="dk1"/>
+            </a:fontRef>
+          </p:style>
+          <p:txBody>
+            <a:bodyPr rtlCol="0" anchor="ctr"/>
+            <a:lstStyle/>
+            <a:p>
+              <a:pPr algn="ctr"/>
+              <a:r>
+                <a:rPr lang="en-US" dirty="0" smtClean="0"/>
+                <a:t>Combine simpler functions</a:t>
+              </a:r>
+              <a:endParaRPr lang="en-US" dirty="0"/>
+            </a:p>
+          </p:txBody>
+        </p:sp>
+        <p:sp>
+          <p:nvSpPr>
+            <p:cNvPr id="23" name="Rounded Rectangle 22"/>
+            <p:cNvSpPr/>
+            <p:nvPr/>
+          </p:nvSpPr>
+          <p:spPr>
+            <a:xfrm>
+              <a:off x="3660004" y="2554845"/>
+              <a:ext cx="1828800" cy="533400"/>
+            </a:xfrm>
+            <a:prstGeom prst="roundRect">
+              <a:avLst/>
+            </a:prstGeom>
+            <a:solidFill>
+              <a:schemeClr val="accent1">
+                <a:lumMod val="20000"/>
+                <a:lumOff val="80000"/>
+              </a:schemeClr>
+            </a:solidFill>
+          </p:spPr>
+          <p:style>
+            <a:lnRef idx="1">
+              <a:schemeClr val="accent1"/>
+            </a:lnRef>
+            <a:fillRef idx="2">
+              <a:schemeClr val="accent1"/>
+            </a:fillRef>
+            <a:effectRef idx="1">
+              <a:schemeClr val="accent1"/>
+            </a:effectRef>
+            <a:fontRef idx="minor">
+              <a:schemeClr val="dk1"/>
+            </a:fontRef>
+          </p:style>
+          <p:txBody>
+            <a:bodyPr rtlCol="0" anchor="ctr"/>
+            <a:lstStyle/>
+            <a:p>
+              <a:pPr algn="ctr"/>
+              <a:r>
+                <a:rPr lang="en-US" dirty="0" smtClean="0"/>
+                <a:t>Use a template</a:t>
+              </a:r>
+              <a:endParaRPr lang="en-US" dirty="0"/>
+            </a:p>
+          </p:txBody>
+        </p:sp>
+        <p:sp>
+          <p:nvSpPr>
+            <p:cNvPr id="28" name="Rounded Rectangle 27"/>
+            <p:cNvSpPr/>
+            <p:nvPr/>
+          </p:nvSpPr>
+          <p:spPr>
+            <a:xfrm>
+              <a:off x="3661609" y="3361528"/>
+              <a:ext cx="1828800" cy="533400"/>
+            </a:xfrm>
+            <a:prstGeom prst="roundRect">
+              <a:avLst/>
+            </a:prstGeom>
+            <a:solidFill>
+              <a:schemeClr val="accent1">
+                <a:lumMod val="20000"/>
+                <a:lumOff val="80000"/>
+              </a:schemeClr>
+            </a:solidFill>
+          </p:spPr>
+          <p:style>
+            <a:lnRef idx="1">
+              <a:schemeClr val="accent1"/>
+            </a:lnRef>
+            <a:fillRef idx="2">
+              <a:schemeClr val="accent1"/>
+            </a:fillRef>
+            <a:effectRef idx="1">
+              <a:schemeClr val="accent1"/>
+            </a:effectRef>
+            <a:fontRef idx="minor">
+              <a:schemeClr val="dk1"/>
+            </a:fontRef>
+          </p:style>
+          <p:txBody>
+            <a:bodyPr rtlCol="0" anchor="ctr"/>
+            <a:lstStyle/>
+            <a:p>
+              <a:pPr algn="ctr"/>
+              <a:r>
+                <a:rPr lang="en-US" dirty="0" smtClean="0"/>
+                <a:t>Divide into Cases</a:t>
+              </a:r>
+              <a:endParaRPr lang="en-US" dirty="0"/>
+            </a:p>
+          </p:txBody>
+        </p:sp>
+        <p:sp>
+          <p:nvSpPr>
+            <p:cNvPr id="38" name="Rounded Rectangle 37"/>
+            <p:cNvSpPr/>
+            <p:nvPr/>
+          </p:nvSpPr>
+          <p:spPr>
+            <a:xfrm>
+              <a:off x="3657598" y="4168211"/>
+              <a:ext cx="1828800" cy="533400"/>
+            </a:xfrm>
+            <a:prstGeom prst="roundRect">
+              <a:avLst/>
+            </a:prstGeom>
+            <a:solidFill>
+              <a:schemeClr val="accent1">
+                <a:lumMod val="20000"/>
+                <a:lumOff val="80000"/>
+              </a:schemeClr>
+            </a:solidFill>
+          </p:spPr>
+          <p:style>
+            <a:lnRef idx="1">
+              <a:schemeClr val="accent1"/>
+            </a:lnRef>
+            <a:fillRef idx="2">
+              <a:schemeClr val="accent1"/>
+            </a:fillRef>
+            <a:effectRef idx="1">
+              <a:schemeClr val="accent1"/>
+            </a:effectRef>
+            <a:fontRef idx="minor">
+              <a:schemeClr val="dk1"/>
+            </a:fontRef>
+          </p:style>
+          <p:txBody>
+            <a:bodyPr rtlCol="0" anchor="ctr"/>
+            <a:lstStyle/>
+            <a:p>
+              <a:pPr algn="ctr"/>
+              <a:r>
+                <a:rPr lang="en-US" dirty="0" smtClean="0"/>
+                <a:t>Call a more general function</a:t>
+              </a:r>
+              <a:endParaRPr lang="en-US" dirty="0"/>
+            </a:p>
+          </p:txBody>
+        </p:sp>
+        <p:sp>
+          <p:nvSpPr>
+            <p:cNvPr id="48" name="Rounded Rectangle 47"/>
+            <p:cNvSpPr/>
+            <p:nvPr/>
+          </p:nvSpPr>
+          <p:spPr>
+            <a:xfrm>
+              <a:off x="3657599" y="5781575"/>
+              <a:ext cx="1828800" cy="533400"/>
+            </a:xfrm>
+            <a:prstGeom prst="roundRect">
+              <a:avLst/>
+            </a:prstGeom>
+            <a:solidFill>
+              <a:schemeClr val="accent1">
+                <a:lumMod val="20000"/>
+                <a:lumOff val="80000"/>
+              </a:schemeClr>
+            </a:solidFill>
+          </p:spPr>
+          <p:style>
+            <a:lnRef idx="1">
+              <a:schemeClr val="accent1"/>
+            </a:lnRef>
+            <a:fillRef idx="2">
+              <a:schemeClr val="accent1"/>
+            </a:fillRef>
+            <a:effectRef idx="1">
+              <a:schemeClr val="accent1"/>
+            </a:effectRef>
+            <a:fontRef idx="minor">
+              <a:schemeClr val="dk1"/>
+            </a:fontRef>
+          </p:style>
+          <p:txBody>
+            <a:bodyPr rtlCol="0" anchor="ctr"/>
+            <a:lstStyle/>
+            <a:p>
+              <a:pPr algn="ctr"/>
+              <a:r>
+                <a:rPr lang="en-US" dirty="0" smtClean="0"/>
+                <a:t>Communicate via State</a:t>
+              </a:r>
+              <a:endParaRPr lang="en-US" dirty="0"/>
+            </a:p>
+          </p:txBody>
+        </p:sp>
+        <p:cxnSp>
+          <p:nvCxnSpPr>
+            <p:cNvPr id="70" name="Straight Arrow Connector 69"/>
+            <p:cNvCxnSpPr>
+              <a:stCxn id="13" idx="2"/>
+              <a:endCxn id="23" idx="0"/>
+            </p:cNvCxnSpPr>
+            <p:nvPr/>
+          </p:nvCxnSpPr>
+          <p:spPr>
+            <a:xfrm>
+              <a:off x="4571999" y="2281562"/>
+              <a:ext cx="2405" cy="273283"/>
+            </a:xfrm>
+            <a:prstGeom prst="straightConnector1">
+              <a:avLst/>
+            </a:prstGeom>
+            <a:ln>
+              <a:tailEnd type="triangle"/>
+            </a:ln>
+          </p:spPr>
+          <p:style>
+            <a:lnRef idx="1">
+              <a:schemeClr val="accent1"/>
+            </a:lnRef>
+            <a:fillRef idx="0">
+              <a:schemeClr val="accent1"/>
+            </a:fillRef>
+            <a:effectRef idx="0">
+              <a:schemeClr val="accent1"/>
+            </a:effectRef>
+            <a:fontRef idx="minor">
+              <a:schemeClr val="tx1"/>
+            </a:fontRef>
+          </p:style>
+        </p:cxnSp>
+        <p:cxnSp>
+          <p:nvCxnSpPr>
+            <p:cNvPr id="72" name="Straight Arrow Connector 71"/>
+            <p:cNvCxnSpPr>
+              <a:stCxn id="23" idx="2"/>
+              <a:endCxn id="28" idx="0"/>
+            </p:cNvCxnSpPr>
+            <p:nvPr/>
+          </p:nvCxnSpPr>
+          <p:spPr>
+            <a:xfrm>
+              <a:off x="4574404" y="3088245"/>
+              <a:ext cx="1605" cy="273283"/>
+            </a:xfrm>
+            <a:prstGeom prst="straightConnector1">
+              <a:avLst/>
+            </a:prstGeom>
+            <a:ln>
+              <a:tailEnd type="triangle"/>
+            </a:ln>
+          </p:spPr>
+          <p:style>
+            <a:lnRef idx="1">
+              <a:schemeClr val="accent1"/>
+            </a:lnRef>
+            <a:fillRef idx="0">
+              <a:schemeClr val="accent1"/>
+            </a:fillRef>
+            <a:effectRef idx="0">
+              <a:schemeClr val="accent1"/>
+            </a:effectRef>
+            <a:fontRef idx="minor">
+              <a:schemeClr val="tx1"/>
+            </a:fontRef>
+          </p:style>
+        </p:cxnSp>
+        <p:cxnSp>
+          <p:nvCxnSpPr>
+            <p:cNvPr id="74" name="Straight Arrow Connector 73"/>
+            <p:cNvCxnSpPr>
+              <a:stCxn id="28" idx="2"/>
+              <a:endCxn id="38" idx="0"/>
+            </p:cNvCxnSpPr>
+            <p:nvPr/>
+          </p:nvCxnSpPr>
+          <p:spPr>
+            <a:xfrm flipH="1">
+              <a:off x="4571998" y="3894928"/>
+              <a:ext cx="4011" cy="273283"/>
+            </a:xfrm>
+            <a:prstGeom prst="straightConnector1">
+              <a:avLst/>
+            </a:prstGeom>
+            <a:ln>
+              <a:tailEnd type="triangle"/>
+            </a:ln>
+          </p:spPr>
+          <p:style>
+            <a:lnRef idx="1">
+              <a:schemeClr val="accent1"/>
+            </a:lnRef>
+            <a:fillRef idx="0">
+              <a:schemeClr val="accent1"/>
+            </a:fillRef>
+            <a:effectRef idx="0">
+              <a:schemeClr val="accent1"/>
+            </a:effectRef>
+            <a:fontRef idx="minor">
+              <a:schemeClr val="tx1"/>
+            </a:fontRef>
+          </p:style>
+        </p:cxnSp>
+        <p:cxnSp>
+          <p:nvCxnSpPr>
+            <p:cNvPr id="77" name="Straight Arrow Connector 76"/>
+            <p:cNvCxnSpPr>
+              <a:stCxn id="38" idx="2"/>
+              <a:endCxn id="43" idx="0"/>
+            </p:cNvCxnSpPr>
+            <p:nvPr/>
+          </p:nvCxnSpPr>
+          <p:spPr>
+            <a:xfrm>
+              <a:off x="4571998" y="4701611"/>
+              <a:ext cx="0" cy="273283"/>
+            </a:xfrm>
+            <a:prstGeom prst="straightConnector1">
+              <a:avLst/>
+            </a:prstGeom>
+            <a:ln>
+              <a:tailEnd type="triangle"/>
+            </a:ln>
+          </p:spPr>
+          <p:style>
+            <a:lnRef idx="1">
+              <a:schemeClr val="accent1"/>
+            </a:lnRef>
+            <a:fillRef idx="0">
+              <a:schemeClr val="accent1"/>
+            </a:fillRef>
+            <a:effectRef idx="0">
+              <a:schemeClr val="accent1"/>
+            </a:effectRef>
+            <a:fontRef idx="minor">
+              <a:schemeClr val="tx1"/>
+            </a:fontRef>
+          </p:style>
+        </p:cxnSp>
+        <p:sp>
+          <p:nvSpPr>
+            <p:cNvPr id="43" name="Rounded Rectangle 42"/>
+            <p:cNvSpPr/>
+            <p:nvPr/>
+          </p:nvSpPr>
+          <p:spPr>
+            <a:xfrm>
+              <a:off x="3657598" y="4974894"/>
+              <a:ext cx="1828800" cy="533400"/>
+            </a:xfrm>
+            <a:prstGeom prst="roundRect">
+              <a:avLst/>
+            </a:prstGeom>
+          </p:spPr>
+          <p:style>
+            <a:lnRef idx="2">
+              <a:schemeClr val="accent2">
+                <a:shade val="50000"/>
+              </a:schemeClr>
+            </a:lnRef>
+            <a:fillRef idx="1">
+              <a:schemeClr val="accent2"/>
+            </a:fillRef>
+            <a:effectRef idx="0">
+              <a:schemeClr val="accent2"/>
+            </a:effectRef>
+            <a:fontRef idx="minor">
+              <a:schemeClr val="lt1"/>
+            </a:fontRef>
+          </p:style>
+          <p:txBody>
+            <a:bodyPr rtlCol="0" anchor="ctr"/>
+            <a:lstStyle/>
+            <a:p>
+              <a:pPr algn="ctr"/>
+              <a:r>
+                <a:rPr lang="en-US" dirty="0" smtClean="0"/>
+                <a:t>Recur on </a:t>
+              </a:r>
+              <a:r>
+                <a:rPr lang="en-US" dirty="0" err="1" smtClean="0"/>
+                <a:t>subproblem</a:t>
+              </a:r>
+              <a:endParaRPr lang="en-US" dirty="0"/>
+            </a:p>
+          </p:txBody>
+        </p:sp>
+      </p:grpSp>
+      <p:cxnSp>
+        <p:nvCxnSpPr>
+          <p:cNvPr id="51" name="Straight Arrow Connector 50"/>
+          <p:cNvCxnSpPr>
+            <a:stCxn id="43" idx="2"/>
+            <a:endCxn id="48" idx="0"/>
+          </p:cNvCxnSpPr>
+          <p:nvPr/>
+        </p:nvCxnSpPr>
+        <p:spPr>
+          <a:xfrm>
+            <a:off x="4571998" y="5508294"/>
+            <a:ext cx="1" cy="273281"/>
+          </a:xfrm>
+          <a:prstGeom prst="straightConnector1">
+            <a:avLst/>
+          </a:prstGeom>
+          <a:ln>
+            <a:tailEnd type="triangle"/>
+          </a:ln>
+        </p:spPr>
+        <p:style>
+          <a:lnRef idx="1">
+            <a:schemeClr val="accent1"/>
+          </a:lnRef>
+          <a:fillRef idx="0">
+            <a:schemeClr val="accent1"/>
+          </a:fillRef>
+          <a:effectRef idx="0">
+            <a:schemeClr val="accent1"/>
+          </a:effectRef>
+          <a:fontRef idx="minor">
+            <a:schemeClr val="tx1"/>
+          </a:fontRef>
+        </p:style>
+      </p:cxnSp>
     </p:spTree>
     <p:extLst>
       <p:ext uri="{BB962C8B-B14F-4D97-AF65-F5344CB8AC3E}">
-        <p14:creationId xmlns:p14="http://schemas.microsoft.com/office/powerpoint/2010/main" val="2002388702"/>
+        <p14:creationId xmlns:p14="http://schemas.microsoft.com/office/powerpoint/2010/main" val="2432272171"/>
       </p:ext>
     </p:extLst>
   </p:cSld>
@@ -16715,19 +16635,8 @@
                 <a:latin typeface="Consolas" pitchFamily="49" charset="0"/>
                 <a:cs typeface="Consolas" pitchFamily="49" charset="0"/>
               </a:rPr>
-              <a:t>;; strategy: </a:t>
-            </a:r>
-            <a:r>
-              <a:rPr lang="en-US" b="1" dirty="0" smtClean="0">
-                <a:latin typeface="Consolas" pitchFamily="49" charset="0"/>
-                <a:cs typeface="Consolas" pitchFamily="49" charset="0"/>
-              </a:rPr>
-              <a:t>recur on (rest lst1) or (rest lst2)</a:t>
-            </a:r>
-            <a:endParaRPr lang="en-US" b="1" dirty="0" smtClean="0">
-              <a:latin typeface="Consolas" pitchFamily="49" charset="0"/>
-              <a:cs typeface="Consolas" pitchFamily="49" charset="0"/>
-            </a:endParaRPr>
+              <a:t>;; strategy: recur on (rest lst1) or (rest lst2)</a:t>
+            </a:r>
           </a:p>
           <a:p>
             <a:pPr>
@@ -18276,15 +18185,7 @@
           <a:p>
             <a:r>
               <a:rPr lang="en-US" dirty="0" smtClean="0"/>
-              <a:t>Our destructor templates always </a:t>
-            </a:r>
-            <a:r>
-              <a:rPr lang="en-US" dirty="0" smtClean="0"/>
-              <a:t>recurred </a:t>
-            </a:r>
-            <a:r>
-              <a:rPr lang="en-US" dirty="0" smtClean="0"/>
-              <a:t>on the sub-pieces of our structure.</a:t>
+              <a:t>Our destructor templates always recurred on the sub-pieces of our structure.</a:t>
             </a:r>
           </a:p>
           <a:p>

</xml_diff>

<commit_message>
shuffled order of lessons in module 08
</commit_message>
<xml_diff>
--- a/Slides/Lesson 8.1 Introducing General Recursion.pptx
+++ b/Slides/Lesson 8.1 Introducing General Recursion.pptx
@@ -313,7 +313,7 @@
             <a:fld id="{CF8F25F6-E1EF-4065-8525-42EDEBD9BD22}" type="datetimeFigureOut">
               <a:rPr lang="en-US" smtClean="0"/>
               <a:pPr/>
-              <a:t>10/18/2016</a:t>
+              <a:t>10/22/2016</a:t>
             </a:fld>
             <a:endParaRPr lang="en-US"/>
           </a:p>
@@ -2820,7 +2820,7 @@
           <a:p>
             <a:fld id="{2F1F79F5-7BEC-496A-AFC7-876E38F64D71}" type="datetime1">
               <a:rPr lang="en-US" smtClean="0"/>
-              <a:t>10/18/2016</a:t>
+              <a:t>10/22/2016</a:t>
             </a:fld>
             <a:endParaRPr lang="en-US"/>
           </a:p>
@@ -2915,7 +2915,7 @@
           <a:p>
             <a:fld id="{0A05703A-7669-4FEA-9056-25299B4D29D4}" type="datetime1">
               <a:rPr lang="en-US" smtClean="0"/>
-              <a:t>10/18/2016</a:t>
+              <a:t>10/22/2016</a:t>
             </a:fld>
             <a:endParaRPr lang="en-US"/>
           </a:p>
@@ -3190,7 +3190,7 @@
           <a:p>
             <a:fld id="{6E5077B5-BB57-49DB-88CA-226A139E5C01}" type="datetime1">
               <a:rPr lang="en-US" smtClean="0"/>
-              <a:t>10/18/2016</a:t>
+              <a:t>10/22/2016</a:t>
             </a:fld>
             <a:endParaRPr lang="en-US"/>
           </a:p>
@@ -3442,7 +3442,7 @@
           <a:p>
             <a:fld id="{C48D9447-CBD6-49A1-89FD-8512A8CF8999}" type="datetime1">
               <a:rPr lang="en-US" smtClean="0"/>
-              <a:t>10/18/2016</a:t>
+              <a:t>10/22/2016</a:t>
             </a:fld>
             <a:endParaRPr lang="en-US"/>
           </a:p>
@@ -3610,7 +3610,7 @@
           <a:p>
             <a:fld id="{A3639A2A-823D-48B7-9ACE-7FAF42870BA9}" type="datetime1">
               <a:rPr lang="en-US" smtClean="0"/>
-              <a:t>10/18/2016</a:t>
+              <a:t>10/22/2016</a:t>
             </a:fld>
             <a:endParaRPr lang="en-US"/>
           </a:p>
@@ -3788,7 +3788,7 @@
           <a:p>
             <a:fld id="{ED1B6996-82E9-463C-972C-7B56056E426C}" type="datetime1">
               <a:rPr lang="en-US" smtClean="0"/>
-              <a:t>10/18/2016</a:t>
+              <a:t>10/22/2016</a:t>
             </a:fld>
             <a:endParaRPr lang="en-US"/>
           </a:p>
@@ -3962,7 +3962,7 @@
           <a:p>
             <a:fld id="{E22ED4DA-448D-4BB1-B935-CC112220207B}" type="datetime1">
               <a:rPr lang="en-US" smtClean="0"/>
-              <a:t>10/18/2016</a:t>
+              <a:t>10/22/2016</a:t>
             </a:fld>
             <a:endParaRPr lang="en-US"/>
           </a:p>
@@ -4135,7 +4135,7 @@
           <a:p>
             <a:fld id="{E22ED4DA-448D-4BB1-B935-CC112220207B}" type="datetime1">
               <a:rPr lang="en-US" smtClean="0"/>
-              <a:t>10/18/2016</a:t>
+              <a:t>10/22/2016</a:t>
             </a:fld>
             <a:endParaRPr lang="en-US"/>
           </a:p>
@@ -4395,7 +4395,7 @@
           <a:p>
             <a:fld id="{FF5D65A6-AB94-4435-B0B7-3743215FA46C}" type="datetime1">
               <a:rPr lang="en-US" smtClean="0"/>
-              <a:t>10/18/2016</a:t>
+              <a:t>10/22/2016</a:t>
             </a:fld>
             <a:endParaRPr lang="en-US"/>
           </a:p>
@@ -4571,7 +4571,7 @@
           <a:p>
             <a:fld id="{FF5D65A6-AB94-4435-B0B7-3743215FA46C}" type="datetime1">
               <a:rPr lang="en-US" smtClean="0"/>
-              <a:t>10/18/2016</a:t>
+              <a:t>10/22/2016</a:t>
             </a:fld>
             <a:endParaRPr lang="en-US"/>
           </a:p>
@@ -4865,7 +4865,7 @@
           <a:p>
             <a:fld id="{7C193DC4-6EF0-48C9-B29C-616106A645E1}" type="datetime1">
               <a:rPr lang="en-US" smtClean="0"/>
-              <a:t>10/18/2016</a:t>
+              <a:t>10/22/2016</a:t>
             </a:fld>
             <a:endParaRPr lang="en-US"/>
           </a:p>
@@ -5150,7 +5150,7 @@
           <a:p>
             <a:fld id="{5D1846AD-9252-4647-9435-4C2AC365653A}" type="datetime1">
               <a:rPr lang="en-US" smtClean="0"/>
-              <a:t>10/18/2016</a:t>
+              <a:t>10/22/2016</a:t>
             </a:fld>
             <a:endParaRPr lang="en-US"/>
           </a:p>
@@ -5569,7 +5569,7 @@
           <a:p>
             <a:fld id="{CE56DC10-3561-4063-A6AF-C1CC7A41040A}" type="datetime1">
               <a:rPr lang="en-US" smtClean="0"/>
-              <a:t>10/18/2016</a:t>
+              <a:t>10/22/2016</a:t>
             </a:fld>
             <a:endParaRPr lang="en-US"/>
           </a:p>
@@ -5686,7 +5686,7 @@
           <a:p>
             <a:fld id="{2F7B77F5-1464-4F6B-92A8-64FC8A508293}" type="datetime1">
               <a:rPr lang="en-US" smtClean="0"/>
-              <a:t>10/18/2016</a:t>
+              <a:t>10/22/2016</a:t>
             </a:fld>
             <a:endParaRPr lang="en-US"/>
           </a:p>
@@ -5909,7 +5909,7 @@
           <a:p>
             <a:fld id="{02B3F677-983B-48DB-ADFD-63FE6CBC7FB2}" type="datetime1">
               <a:rPr lang="en-US" smtClean="0"/>
-              <a:t>10/18/2016</a:t>
+              <a:t>10/22/2016</a:t>
             </a:fld>
             <a:endParaRPr lang="en-US"/>
           </a:p>
@@ -8586,7 +8586,7 @@
         <p:spPr/>
         <p:txBody>
           <a:bodyPr>
-            <a:normAutofit fontScale="47500" lnSpcReduction="20000"/>
+            <a:normAutofit fontScale="55000" lnSpcReduction="20000"/>
           </a:bodyPr>
           <a:lstStyle/>
           <a:p>
@@ -8895,33 +8895,33 @@
                 <a:latin typeface="Consolas" pitchFamily="49" charset="0"/>
                 <a:cs typeface="Consolas" pitchFamily="49" charset="0"/>
               </a:rPr>
-              <a:t>       ;; at this point we know that</a:t>
-            </a:r>
-          </a:p>
-          <a:p>
-            <a:pPr>
-              <a:buNone/>
-            </a:pPr>
+              <a:t>       ;; at this point we know that </a:t>
+            </a:r>
+            <a:r>
+              <a:rPr lang="en-US" b="1" dirty="0" err="1">
+                <a:latin typeface="Consolas" pitchFamily="49" charset="0"/>
+                <a:cs typeface="Consolas" pitchFamily="49" charset="0"/>
+              </a:rPr>
+              <a:t>sexp</a:t>
+            </a:r>
             <a:r>
               <a:rPr lang="en-US" b="1" dirty="0">
                 <a:latin typeface="Consolas" pitchFamily="49" charset="0"/>
                 <a:cs typeface="Consolas" pitchFamily="49" charset="0"/>
               </a:rPr>
-              <a:t>       ;; </a:t>
-            </a:r>
-            <a:r>
-              <a:rPr lang="en-US" b="1" dirty="0" err="1">
-                <a:latin typeface="Consolas" pitchFamily="49" charset="0"/>
-                <a:cs typeface="Consolas" pitchFamily="49" charset="0"/>
-              </a:rPr>
-              <a:t>sexp</a:t>
-            </a:r>
+              <a:t> is a list, so it is</a:t>
+            </a:r>
+          </a:p>
+          <a:p>
+            <a:pPr>
+              <a:buNone/>
+            </a:pPr>
             <a:r>
               <a:rPr lang="en-US" b="1" dirty="0">
                 <a:latin typeface="Consolas" pitchFamily="49" charset="0"/>
                 <a:cs typeface="Consolas" pitchFamily="49" charset="0"/>
               </a:rPr>
-              <a:t> is a list, so it is safe to call list functions on it.</a:t>
+              <a:t>       ;; safe to call list functions on it.</a:t>
             </a:r>
           </a:p>
           <a:p>
@@ -9426,7 +9426,7 @@
           <a:p>
             <a:r>
               <a:rPr lang="en-US" dirty="0"/>
-              <a:t>It's "divide-and-conquer"</a:t>
+              <a:t>It's more like "divide-and-conquer"</a:t>
             </a:r>
           </a:p>
           <a:p>
@@ -10809,6 +10809,20 @@
               <a:t>Divide the list in half, sort each half, and then merge two sorted lists.</a:t>
             </a:r>
           </a:p>
+          <a:p>
+            <a:r>
+              <a:rPr lang="en-US" dirty="0"/>
+              <a:t>First we write </a:t>
+            </a:r>
+            <a:r>
+              <a:rPr lang="en-US" b="1" dirty="0"/>
+              <a:t>merge</a:t>
+            </a:r>
+            <a:r>
+              <a:rPr lang="en-US" dirty="0"/>
+              <a:t>, which merges two sorted lists:</a:t>
+            </a:r>
+          </a:p>
         </p:txBody>
       </p:sp>
       <p:sp>
@@ -10968,7 +10982,7 @@
                 <a:latin typeface="Consolas" pitchFamily="49" charset="0"/>
                 <a:cs typeface="Consolas" pitchFamily="49" charset="0"/>
               </a:rPr>
-              <a:t>;; merges its two arguments</a:t>
+              <a:t>;; RETURNS: the sorted merge of its two arguments</a:t>
             </a:r>
           </a:p>
           <a:p>
@@ -10992,7 +11006,17 @@
                 <a:latin typeface="Consolas" pitchFamily="49" charset="0"/>
                 <a:cs typeface="Consolas" pitchFamily="49" charset="0"/>
               </a:rPr>
-              <a:t>;; HALTING MEASURE: ???</a:t>
+              <a:t>;; </a:t>
+            </a:r>
+            <a:r>
+              <a:rPr lang="en-US" b="1" dirty="0">
+                <a:solidFill>
+                  <a:schemeClr val="accent6"/>
+                </a:solidFill>
+                <a:latin typeface="Consolas" pitchFamily="49" charset="0"/>
+                <a:cs typeface="Consolas" pitchFamily="49" charset="0"/>
+              </a:rPr>
+              <a:t>HALTING MEASURE: ???</a:t>
             </a:r>
           </a:p>
           <a:p>
@@ -11379,6 +11403,9 @@
             </a:pPr>
             <a:r>
               <a:rPr lang="en-US" b="1" dirty="0">
+                <a:solidFill>
+                  <a:schemeClr val="accent6"/>
+                </a:solidFill>
                 <a:latin typeface="Consolas" pitchFamily="49" charset="0"/>
                 <a:cs typeface="Consolas" pitchFamily="49" charset="0"/>
               </a:rPr>
@@ -13371,7 +13398,7 @@
                   <a:srgbClr val="FF0000"/>
                 </a:solidFill>
               </a:rPr>
-              <a:t>   	are both  </a:t>
+              <a:t>   	are both </a:t>
             </a:r>
             <a:r>
               <a:rPr lang="en-US" sz="3300" b="1" i="1" dirty="0">
@@ -13615,140 +13642,210 @@
           </a:p>
         </p:txBody>
       </p:sp>
-      <p:sp>
-        <p:nvSpPr>
-          <p:cNvPr id="3" name="Content Placeholder 2"/>
-          <p:cNvSpPr>
-            <a:spLocks noGrp="1"/>
-          </p:cNvSpPr>
-          <p:nvPr>
-            <p:ph idx="1"/>
-          </p:nvPr>
-        </p:nvSpPr>
-        <p:spPr/>
-        <p:txBody>
-          <a:bodyPr>
-            <a:normAutofit fontScale="85000" lnSpcReduction="20000"/>
-          </a:bodyPr>
-          <a:lstStyle/>
-          <a:p>
-            <a:r>
-              <a:rPr lang="en-US" dirty="0"/>
-              <a:t>Splitting the list in this way takes time proportional to the length n of the list.  The call to merge likewise takes time proportional to </a:t>
-            </a:r>
-            <a:r>
-              <a:rPr lang="en-US" b="1" dirty="0"/>
-              <a:t>n</a:t>
-            </a:r>
-            <a:r>
-              <a:rPr lang="en-US" dirty="0"/>
-              <a:t>.  We say this time is </a:t>
-            </a:r>
-            <a:r>
-              <a:rPr lang="en-US" b="1" dirty="0"/>
-              <a:t>O(n)</a:t>
-            </a:r>
-            <a:r>
-              <a:rPr lang="en-US" dirty="0"/>
-              <a:t>.</a:t>
-            </a:r>
-          </a:p>
-          <a:p>
-            <a:r>
-              <a:rPr lang="en-US" dirty="0"/>
-              <a:t>If </a:t>
-            </a:r>
-            <a:r>
-              <a:rPr lang="en-US" b="1" dirty="0"/>
-              <a:t>T(n) </a:t>
-            </a:r>
-            <a:r>
-              <a:rPr lang="en-US" dirty="0"/>
-              <a:t>is the time to sort a list of length </a:t>
-            </a:r>
-            <a:r>
-              <a:rPr lang="en-US" b="1" dirty="0"/>
-              <a:t>n</a:t>
-            </a:r>
-            <a:r>
-              <a:rPr lang="en-US" dirty="0"/>
-              <a:t>, then </a:t>
-            </a:r>
-            <a:r>
-              <a:rPr lang="en-US" b="1" dirty="0"/>
-              <a:t>T(n) </a:t>
-            </a:r>
-            <a:r>
-              <a:rPr lang="en-US" dirty="0"/>
-              <a:t>is equal to the time </a:t>
-            </a:r>
-            <a:r>
-              <a:rPr lang="en-US" b="1" dirty="0"/>
-              <a:t>2*T(n/2) </a:t>
-            </a:r>
-            <a:r>
-              <a:rPr lang="en-US" dirty="0"/>
-              <a:t>that it takes to sort the two </a:t>
-            </a:r>
-            <a:r>
-              <a:rPr lang="en-US" dirty="0" err="1"/>
-              <a:t>sublists</a:t>
-            </a:r>
-            <a:r>
-              <a:rPr lang="en-US" dirty="0"/>
-              <a:t>, plus the time </a:t>
-            </a:r>
-            <a:r>
-              <a:rPr lang="en-US" b="1" dirty="0"/>
-              <a:t>O(n) </a:t>
-            </a:r>
-            <a:r>
-              <a:rPr lang="en-US" dirty="0"/>
-              <a:t>of splitting the list and merging the two results:</a:t>
-            </a:r>
-          </a:p>
-          <a:p>
-            <a:r>
-              <a:rPr lang="en-US" dirty="0"/>
-              <a:t>So the overall time is</a:t>
-            </a:r>
-          </a:p>
-          <a:p>
-            <a:pPr marL="0" indent="0" algn="ctr">
-              <a:buNone/>
-            </a:pPr>
-            <a:r>
-              <a:rPr lang="en-US" b="1" dirty="0"/>
-              <a:t>T(n) = 2*T(n/2) + O(n)</a:t>
-            </a:r>
-          </a:p>
-          <a:p>
-            <a:r>
-              <a:rPr lang="en-US" dirty="0"/>
-              <a:t>When you take algorithms, you will learn that all this implies that </a:t>
-            </a:r>
-            <a:r>
-              <a:rPr lang="en-US" b="1" dirty="0"/>
-              <a:t>T(n) = O(n log n).  </a:t>
-            </a:r>
-            <a:r>
-              <a:rPr lang="en-US" dirty="0"/>
-              <a:t>This is better than an insertion sort, which takes </a:t>
-            </a:r>
-            <a:r>
-              <a:rPr lang="en-US" b="1" dirty="0"/>
-              <a:t>O(n^2)</a:t>
-            </a:r>
-            <a:r>
-              <a:rPr lang="en-US" dirty="0"/>
-              <a:t>. </a:t>
-            </a:r>
-          </a:p>
-          <a:p>
-            <a:endParaRPr lang="en-US" dirty="0"/>
-          </a:p>
-        </p:txBody>
-      </p:sp>
+      <mc:AlternateContent xmlns:mc="http://schemas.openxmlformats.org/markup-compatibility/2006">
+        <mc:Choice xmlns:a14="http://schemas.microsoft.com/office/drawing/2010/main" Requires="a14">
+          <p:sp>
+            <p:nvSpPr>
+              <p:cNvPr id="3" name="Content Placeholder 2"/>
+              <p:cNvSpPr>
+                <a:spLocks noGrp="1"/>
+              </p:cNvSpPr>
+              <p:nvPr>
+                <p:ph idx="1"/>
+              </p:nvPr>
+            </p:nvSpPr>
+            <p:spPr/>
+            <p:txBody>
+              <a:bodyPr>
+                <a:normAutofit fontScale="85000" lnSpcReduction="20000"/>
+              </a:bodyPr>
+              <a:lstStyle/>
+              <a:p>
+                <a:r>
+                  <a:rPr lang="en-US" dirty="0"/>
+                  <a:t>Splitting the list in this way takes time proportional to the length n of the list.  The call to merge likewise takes time proportional to </a:t>
+                </a:r>
+                <a:r>
+                  <a:rPr lang="en-US" b="1" dirty="0"/>
+                  <a:t>n</a:t>
+                </a:r>
+                <a:r>
+                  <a:rPr lang="en-US" dirty="0"/>
+                  <a:t>.  We say this time is </a:t>
+                </a:r>
+                <a:r>
+                  <a:rPr lang="en-US" b="1" dirty="0"/>
+                  <a:t>O(n)</a:t>
+                </a:r>
+                <a:r>
+                  <a:rPr lang="en-US" dirty="0"/>
+                  <a:t>.</a:t>
+                </a:r>
+              </a:p>
+              <a:p>
+                <a:r>
+                  <a:rPr lang="en-US" dirty="0"/>
+                  <a:t>If </a:t>
+                </a:r>
+                <a:r>
+                  <a:rPr lang="en-US" b="1" dirty="0"/>
+                  <a:t>T(n) </a:t>
+                </a:r>
+                <a:r>
+                  <a:rPr lang="en-US" dirty="0"/>
+                  <a:t>is the time to sort a list of length </a:t>
+                </a:r>
+                <a:r>
+                  <a:rPr lang="en-US" b="1" dirty="0"/>
+                  <a:t>n</a:t>
+                </a:r>
+                <a:r>
+                  <a:rPr lang="en-US" dirty="0"/>
+                  <a:t>, then </a:t>
+                </a:r>
+                <a:r>
+                  <a:rPr lang="en-US" b="1" dirty="0"/>
+                  <a:t>T(n) </a:t>
+                </a:r>
+                <a:r>
+                  <a:rPr lang="en-US" dirty="0"/>
+                  <a:t>is equal to the time </a:t>
+                </a:r>
+                <a:r>
+                  <a:rPr lang="en-US" b="1" dirty="0"/>
+                  <a:t>2*T(n/2) </a:t>
+                </a:r>
+                <a:r>
+                  <a:rPr lang="en-US" dirty="0"/>
+                  <a:t>that it takes to sort the two </a:t>
+                </a:r>
+                <a:r>
+                  <a:rPr lang="en-US" dirty="0" err="1"/>
+                  <a:t>sublists</a:t>
+                </a:r>
+                <a:r>
+                  <a:rPr lang="en-US" dirty="0"/>
+                  <a:t>, plus the time </a:t>
+                </a:r>
+                <a:r>
+                  <a:rPr lang="en-US" b="1" dirty="0"/>
+                  <a:t>O(n) </a:t>
+                </a:r>
+                <a:r>
+                  <a:rPr lang="en-US" dirty="0"/>
+                  <a:t>of splitting the list and merging the two results:</a:t>
+                </a:r>
+              </a:p>
+              <a:p>
+                <a:r>
+                  <a:rPr lang="en-US" dirty="0"/>
+                  <a:t>So the overall time is</a:t>
+                </a:r>
+              </a:p>
+              <a:p>
+                <a:pPr marL="0" indent="0" algn="ctr">
+                  <a:buNone/>
+                </a:pPr>
+                <a:r>
+                  <a:rPr lang="en-US" b="1" dirty="0"/>
+                  <a:t>T(n) = 2*T(n/2) + O(n)</a:t>
+                </a:r>
+              </a:p>
+              <a:p>
+                <a:r>
+                  <a:rPr lang="en-US" dirty="0"/>
+                  <a:t>When you take algorithms, you will learn that all this implies that </a:t>
+                </a:r>
+                <a:r>
+                  <a:rPr lang="en-US" b="1" dirty="0"/>
+                  <a:t>T(n) = O(n log n).  </a:t>
+                </a:r>
+                <a:r>
+                  <a:rPr lang="en-US" dirty="0"/>
+                  <a:t>This is better than an insertion sort, which takes </a:t>
+                </a:r>
+                <a:r>
+                  <a:rPr lang="en-US" b="1" dirty="0"/>
+                  <a:t>O(</a:t>
+                </a:r>
+                <a14:m>
+                  <m:oMath xmlns:m="http://schemas.openxmlformats.org/officeDocument/2006/math">
+                    <m:sSup>
+                      <m:sSupPr>
+                        <m:ctrlPr>
+                          <a:rPr lang="en-US" b="1" i="1" dirty="0" smtClean="0">
+                            <a:latin typeface="Cambria Math" panose="02040503050406030204" pitchFamily="18" charset="0"/>
+                          </a:rPr>
+                        </m:ctrlPr>
+                      </m:sSupPr>
+                      <m:e>
+                        <m:r>
+                          <a:rPr lang="en-US" b="1" i="1" dirty="0" smtClean="0">
+                            <a:latin typeface="Cambria Math" panose="02040503050406030204" pitchFamily="18" charset="0"/>
+                          </a:rPr>
+                          <m:t>𝒏</m:t>
+                        </m:r>
+                      </m:e>
+                      <m:sup>
+                        <m:r>
+                          <a:rPr lang="en-US" b="1" i="1" dirty="0" smtClean="0">
+                            <a:latin typeface="Cambria Math" panose="02040503050406030204" pitchFamily="18" charset="0"/>
+                          </a:rPr>
+                          <m:t>𝟐</m:t>
+                        </m:r>
+                      </m:sup>
+                    </m:sSup>
+                  </m:oMath>
+                </a14:m>
+                <a:r>
+                  <a:rPr lang="en-US" b="1" dirty="0"/>
+                  <a:t>)</a:t>
+                </a:r>
+                <a:r>
+                  <a:rPr lang="en-US" dirty="0"/>
+                  <a:t>. </a:t>
+                </a:r>
+              </a:p>
+              <a:p>
+                <a:endParaRPr lang="en-US" dirty="0"/>
+              </a:p>
+            </p:txBody>
+          </p:sp>
+        </mc:Choice>
+        <mc:Fallback>
+          <p:sp>
+            <p:nvSpPr>
+              <p:cNvPr id="3" name="Content Placeholder 2"/>
+              <p:cNvSpPr>
+                <a:spLocks noGrp="1" noRot="1" noChangeAspect="1" noMove="1" noResize="1" noEditPoints="1" noAdjustHandles="1" noChangeArrowheads="1" noChangeShapeType="1" noTextEdit="1"/>
+              </p:cNvSpPr>
+              <p:nvPr>
+                <p:ph idx="1"/>
+              </p:nvPr>
+            </p:nvSpPr>
+            <p:spPr>
+              <a:blipFill>
+                <a:blip r:embed="rId2"/>
+                <a:stretch>
+                  <a:fillRect l="-1259" t="-2830" r="-2000" b="-404"/>
+                </a:stretch>
+              </a:blipFill>
+            </p:spPr>
+            <p:txBody>
+              <a:bodyPr/>
+              <a:lstStyle/>
+              <a:p>
+                <a:r>
+                  <a:rPr lang="en-US">
+                    <a:noFill/>
+                  </a:rPr>
+                  <a:t> </a:t>
+                </a:r>
+              </a:p>
+            </p:txBody>
+          </p:sp>
+        </mc:Fallback>
+      </mc:AlternateContent>
       <p:sp>
         <p:nvSpPr>
           <p:cNvPr id="4" name="Slide Number Placeholder 3"/>
@@ -13816,13 +13913,13 @@
         <p:spPr/>
         <p:txBody>
           <a:bodyPr>
-            <a:normAutofit fontScale="90000"/>
+            <a:normAutofit/>
           </a:bodyPr>
           <a:lstStyle/>
           <a:p>
             <a:r>
               <a:rPr lang="en-US" dirty="0"/>
-              <a:t>Let's look at some patterns for general recursion</a:t>
+              <a:t>The General Recursion Strategy</a:t>
             </a:r>
           </a:p>
         </p:txBody>
@@ -13846,7 +13943,7 @@
           <a:p>
             <a:r>
               <a:rPr lang="en-US" dirty="0"/>
-              <a:t>Outline for divide-and-conquer (general recursion)</a:t>
+              <a:t>Strategy for divide-and-conquer (general recursion)</a:t>
             </a:r>
           </a:p>
           <a:p>
@@ -13919,6 +14016,96 @@
           </a:p>
         </p:txBody>
       </p:sp>
+      <p:sp>
+        <p:nvSpPr>
+          <p:cNvPr id="5" name="Rectangle 4"/>
+          <p:cNvSpPr/>
+          <p:nvPr/>
+        </p:nvSpPr>
+        <p:spPr>
+          <a:xfrm>
+            <a:off x="5867400" y="2209800"/>
+            <a:ext cx="2133600" cy="1040546"/>
+          </a:xfrm>
+          <a:prstGeom prst="rect">
+            <a:avLst/>
+          </a:prstGeom>
+          <a:solidFill>
+            <a:schemeClr val="accent1">
+              <a:lumMod val="20000"/>
+              <a:lumOff val="80000"/>
+            </a:schemeClr>
+          </a:solidFill>
+          <a:ln>
+            <a:noFill/>
+          </a:ln>
+        </p:spPr>
+        <p:style>
+          <a:lnRef idx="2">
+            <a:schemeClr val="accent1"/>
+          </a:lnRef>
+          <a:fillRef idx="1">
+            <a:schemeClr val="lt1"/>
+          </a:fillRef>
+          <a:effectRef idx="0">
+            <a:schemeClr val="accent1"/>
+          </a:effectRef>
+          <a:fontRef idx="minor">
+            <a:schemeClr val="dk1"/>
+          </a:fontRef>
+        </p:style>
+        <p:txBody>
+          <a:bodyPr rot="0" spcFirstLastPara="0" vertOverflow="overflow" horzOverflow="overflow" vert="horz" wrap="square" lIns="91440" tIns="45720" rIns="91440" bIns="45720" numCol="1" spcCol="0" rtlCol="0" fromWordArt="0" anchor="ctr" anchorCtr="0" forceAA="0" compatLnSpc="1">
+            <a:prstTxWarp prst="textNoShape">
+              <a:avLst/>
+            </a:prstTxWarp>
+            <a:noAutofit/>
+          </a:bodyPr>
+          <a:lstStyle/>
+          <a:p>
+            <a:pPr algn="ctr"/>
+            <a:r>
+              <a:rPr lang="en-US" sz="2000" dirty="0"/>
+              <a:t>that is, smaller in the halting measure</a:t>
+            </a:r>
+          </a:p>
+        </p:txBody>
+      </p:sp>
+      <p:cxnSp>
+        <p:nvCxnSpPr>
+          <p:cNvPr id="7" name="Straight Arrow Connector 6"/>
+          <p:cNvCxnSpPr>
+            <a:stCxn id="5" idx="1"/>
+          </p:cNvCxnSpPr>
+          <p:nvPr/>
+        </p:nvCxnSpPr>
+        <p:spPr>
+          <a:xfrm flipH="1">
+            <a:off x="4343400" y="2730073"/>
+            <a:ext cx="1524000" cy="698927"/>
+          </a:xfrm>
+          <a:prstGeom prst="straightConnector1">
+            <a:avLst/>
+          </a:prstGeom>
+          <a:ln>
+            <a:tailEnd type="triangle"/>
+          </a:ln>
+        </p:spPr>
+        <p:style>
+          <a:lnRef idx="1">
+            <a:schemeClr val="accent1"/>
+          </a:lnRef>
+          <a:fillRef idx="0">
+            <a:schemeClr val="accent1"/>
+          </a:fillRef>
+          <a:effectRef idx="0">
+            <a:schemeClr val="accent1"/>
+          </a:effectRef>
+          <a:fontRef idx="minor">
+            <a:schemeClr val="tx1"/>
+          </a:fontRef>
+        </p:style>
+      </p:cxnSp>
     </p:spTree>
     <p:extLst>
       <p:ext uri="{BB962C8B-B14F-4D97-AF65-F5344CB8AC3E}">
@@ -15917,13 +16104,13 @@
         <p:spPr/>
         <p:txBody>
           <a:bodyPr>
-            <a:normAutofit/>
+            <a:normAutofit fontScale="90000"/>
           </a:bodyPr>
           <a:lstStyle/>
           <a:p>
             <a:r>
               <a:rPr lang="en-US" dirty="0"/>
-              <a:t>There's more than one pattern</a:t>
+              <a:t>There's more than one pattern for the function definition</a:t>
             </a:r>
           </a:p>
         </p:txBody>
@@ -15952,7 +16139,7 @@
           <a:p>
             <a:r>
               <a:rPr lang="en-US" dirty="0"/>
-              <a:t>The pattern might take different shapes, depending on our problem. </a:t>
+              <a:t>The function definition might take different shapes, depending on the problem. </a:t>
             </a:r>
           </a:p>
           <a:p>
@@ -15966,7 +16153,13 @@
             </a:r>
             <a:r>
               <a:rPr lang="en-US" dirty="0"/>
-              <a:t>. </a:t>
+              <a:t>.</a:t>
+            </a:r>
+          </a:p>
+          <a:p>
+            <a:r>
+              <a:rPr lang="en-US" dirty="0"/>
+              <a:t>Let's look at some possibilities: </a:t>
             </a:r>
           </a:p>
           <a:p>
@@ -16509,7 +16702,7 @@
           <a:p>
             <a:r>
               <a:rPr lang="en-US" dirty="0"/>
-              <a:t>There is no magic recipe for finding easier </a:t>
+              <a:t>There is no magic recipe for finding smaller </a:t>
             </a:r>
             <a:r>
               <a:rPr lang="en-US" dirty="0" err="1"/>
@@ -19475,13 +19668,13 @@
           <a:p>
             <a:r>
               <a:rPr lang="en-US" dirty="0"/>
-              <a:t>Our destructor templates always recurred on the sub-pieces of our structure.</a:t>
+              <a:t>Our observer templates always recurred on the sub-pieces of our structure.</a:t>
             </a:r>
           </a:p>
           <a:p>
             <a:r>
               <a:rPr lang="en-US" dirty="0"/>
-              <a:t>We call this </a:t>
+              <a:t>This is sometimes called </a:t>
             </a:r>
             <a:r>
               <a:rPr lang="en-US" i="1" dirty="0">

</xml_diff>

<commit_message>
working on Lesson 8.5
</commit_message>
<xml_diff>
--- a/Slides/Lesson 8.1 Introducing General Recursion.pptx
+++ b/Slides/Lesson 8.1 Introducing General Recursion.pptx
@@ -313,7 +313,7 @@
             <a:fld id="{CF8F25F6-E1EF-4065-8525-42EDEBD9BD22}" type="datetimeFigureOut">
               <a:rPr lang="en-US" smtClean="0"/>
               <a:pPr/>
-              <a:t>10/22/2016</a:t>
+              <a:t>10/24/2016</a:t>
             </a:fld>
             <a:endParaRPr lang="en-US"/>
           </a:p>
@@ -2820,7 +2820,7 @@
           <a:p>
             <a:fld id="{2F1F79F5-7BEC-496A-AFC7-876E38F64D71}" type="datetime1">
               <a:rPr lang="en-US" smtClean="0"/>
-              <a:t>10/22/2016</a:t>
+              <a:t>10/24/2016</a:t>
             </a:fld>
             <a:endParaRPr lang="en-US"/>
           </a:p>
@@ -2915,7 +2915,7 @@
           <a:p>
             <a:fld id="{0A05703A-7669-4FEA-9056-25299B4D29D4}" type="datetime1">
               <a:rPr lang="en-US" smtClean="0"/>
-              <a:t>10/22/2016</a:t>
+              <a:t>10/24/2016</a:t>
             </a:fld>
             <a:endParaRPr lang="en-US"/>
           </a:p>
@@ -3190,7 +3190,7 @@
           <a:p>
             <a:fld id="{6E5077B5-BB57-49DB-88CA-226A139E5C01}" type="datetime1">
               <a:rPr lang="en-US" smtClean="0"/>
-              <a:t>10/22/2016</a:t>
+              <a:t>10/24/2016</a:t>
             </a:fld>
             <a:endParaRPr lang="en-US"/>
           </a:p>
@@ -3442,7 +3442,7 @@
           <a:p>
             <a:fld id="{C48D9447-CBD6-49A1-89FD-8512A8CF8999}" type="datetime1">
               <a:rPr lang="en-US" smtClean="0"/>
-              <a:t>10/22/2016</a:t>
+              <a:t>10/24/2016</a:t>
             </a:fld>
             <a:endParaRPr lang="en-US"/>
           </a:p>
@@ -3610,7 +3610,7 @@
           <a:p>
             <a:fld id="{A3639A2A-823D-48B7-9ACE-7FAF42870BA9}" type="datetime1">
               <a:rPr lang="en-US" smtClean="0"/>
-              <a:t>10/22/2016</a:t>
+              <a:t>10/24/2016</a:t>
             </a:fld>
             <a:endParaRPr lang="en-US"/>
           </a:p>
@@ -3788,7 +3788,7 @@
           <a:p>
             <a:fld id="{ED1B6996-82E9-463C-972C-7B56056E426C}" type="datetime1">
               <a:rPr lang="en-US" smtClean="0"/>
-              <a:t>10/22/2016</a:t>
+              <a:t>10/24/2016</a:t>
             </a:fld>
             <a:endParaRPr lang="en-US"/>
           </a:p>
@@ -3962,7 +3962,7 @@
           <a:p>
             <a:fld id="{E22ED4DA-448D-4BB1-B935-CC112220207B}" type="datetime1">
               <a:rPr lang="en-US" smtClean="0"/>
-              <a:t>10/22/2016</a:t>
+              <a:t>10/24/2016</a:t>
             </a:fld>
             <a:endParaRPr lang="en-US"/>
           </a:p>
@@ -4135,7 +4135,7 @@
           <a:p>
             <a:fld id="{E22ED4DA-448D-4BB1-B935-CC112220207B}" type="datetime1">
               <a:rPr lang="en-US" smtClean="0"/>
-              <a:t>10/22/2016</a:t>
+              <a:t>10/24/2016</a:t>
             </a:fld>
             <a:endParaRPr lang="en-US"/>
           </a:p>
@@ -4395,7 +4395,7 @@
           <a:p>
             <a:fld id="{FF5D65A6-AB94-4435-B0B7-3743215FA46C}" type="datetime1">
               <a:rPr lang="en-US" smtClean="0"/>
-              <a:t>10/22/2016</a:t>
+              <a:t>10/24/2016</a:t>
             </a:fld>
             <a:endParaRPr lang="en-US"/>
           </a:p>
@@ -4571,7 +4571,7 @@
           <a:p>
             <a:fld id="{FF5D65A6-AB94-4435-B0B7-3743215FA46C}" type="datetime1">
               <a:rPr lang="en-US" smtClean="0"/>
-              <a:t>10/22/2016</a:t>
+              <a:t>10/24/2016</a:t>
             </a:fld>
             <a:endParaRPr lang="en-US"/>
           </a:p>
@@ -4865,7 +4865,7 @@
           <a:p>
             <a:fld id="{7C193DC4-6EF0-48C9-B29C-616106A645E1}" type="datetime1">
               <a:rPr lang="en-US" smtClean="0"/>
-              <a:t>10/22/2016</a:t>
+              <a:t>10/24/2016</a:t>
             </a:fld>
             <a:endParaRPr lang="en-US"/>
           </a:p>
@@ -5150,7 +5150,7 @@
           <a:p>
             <a:fld id="{5D1846AD-9252-4647-9435-4C2AC365653A}" type="datetime1">
               <a:rPr lang="en-US" smtClean="0"/>
-              <a:t>10/22/2016</a:t>
+              <a:t>10/24/2016</a:t>
             </a:fld>
             <a:endParaRPr lang="en-US"/>
           </a:p>
@@ -5569,7 +5569,7 @@
           <a:p>
             <a:fld id="{CE56DC10-3561-4063-A6AF-C1CC7A41040A}" type="datetime1">
               <a:rPr lang="en-US" smtClean="0"/>
-              <a:t>10/22/2016</a:t>
+              <a:t>10/24/2016</a:t>
             </a:fld>
             <a:endParaRPr lang="en-US"/>
           </a:p>
@@ -5686,7 +5686,7 @@
           <a:p>
             <a:fld id="{2F7B77F5-1464-4F6B-92A8-64FC8A508293}" type="datetime1">
               <a:rPr lang="en-US" smtClean="0"/>
-              <a:t>10/22/2016</a:t>
+              <a:t>10/24/2016</a:t>
             </a:fld>
             <a:endParaRPr lang="en-US"/>
           </a:p>
@@ -5909,7 +5909,7 @@
           <a:p>
             <a:fld id="{02B3F677-983B-48DB-ADFD-63FE6CBC7FB2}" type="datetime1">
               <a:rPr lang="en-US" smtClean="0"/>
-              <a:t>10/22/2016</a:t>
+              <a:t>10/24/2016</a:t>
             </a:fld>
             <a:endParaRPr lang="en-US"/>
           </a:p>
@@ -12018,7 +12018,7 @@
         <p:spPr/>
         <p:txBody>
           <a:bodyPr>
-            <a:normAutofit fontScale="85000" lnSpcReduction="10000"/>
+            <a:normAutofit/>
           </a:bodyPr>
           <a:lstStyle/>
           <a:p>
@@ -12030,7 +12030,7 @@
           <a:p>
             <a:r>
               <a:rPr lang="en-US" dirty="0"/>
-              <a:t>This is called a </a:t>
+              <a:t>This is called the </a:t>
             </a:r>
             <a:r>
               <a:rPr lang="en-US" i="1" dirty="0">
@@ -12038,17 +12038,11 @@
                   <a:srgbClr val="FF0000"/>
                 </a:solidFill>
               </a:rPr>
-              <a:t>termination argument</a:t>
+              <a:t>termination reasoning</a:t>
             </a:r>
             <a:r>
               <a:rPr lang="en-US" dirty="0"/>
               <a:t>.</a:t>
-            </a:r>
-          </a:p>
-          <a:p>
-            <a:r>
-              <a:rPr lang="en-US" dirty="0"/>
-              <a:t>Here we mean an argument in the sense of an argument in a debate, not in the sense of an argument to a function.  Don't get confused by this.</a:t>
             </a:r>
           </a:p>
           <a:p>
@@ -12135,7 +12129,7 @@
           <a:p>
             <a:r>
               <a:rPr lang="en-US" dirty="0"/>
-              <a:t>Termination Argument for </a:t>
+              <a:t>Termination Reasoning for </a:t>
             </a:r>
             <a:r>
               <a:rPr lang="en-US" b="1" dirty="0"/>
@@ -12179,7 +12173,7 @@
           <a:p>
             <a:r>
               <a:rPr lang="en-US" dirty="0"/>
-              <a:t>Termination argument:</a:t>
+              <a:t>Termination reasoning:</a:t>
             </a:r>
           </a:p>
           <a:p>
@@ -13118,7 +13112,7 @@
           <a:p>
             <a:r>
               <a:rPr lang="en-US" dirty="0"/>
-              <a:t>Termination Argument for </a:t>
+              <a:t>Termination Reasoning for </a:t>
             </a:r>
             <a:r>
               <a:rPr lang="en-US" b="1" dirty="0">
@@ -13181,7 +13175,7 @@
               <a:rPr lang="en-US" sz="3300" dirty="0">
                 <a:cs typeface="Consolas" pitchFamily="49" charset="0"/>
               </a:rPr>
-              <a:t>Termination argument:</a:t>
+              <a:t>Termination reasoning:</a:t>
             </a:r>
           </a:p>
           <a:p>
@@ -13642,8 +13636,8 @@
           </a:p>
         </p:txBody>
       </p:sp>
-      <mc:AlternateContent xmlns:mc="http://schemas.openxmlformats.org/markup-compatibility/2006">
-        <mc:Choice xmlns:a14="http://schemas.microsoft.com/office/drawing/2010/main" Requires="a14">
+      <mc:AlternateContent xmlns:mc="http://schemas.openxmlformats.org/markup-compatibility/2006" xmlns:a14="http://schemas.microsoft.com/office/drawing/2010/main">
+        <mc:Choice Requires="a14">
           <p:sp>
             <p:nvSpPr>
               <p:cNvPr id="3" name="Content Placeholder 2"/>
@@ -13812,7 +13806,7 @@
             </p:txBody>
           </p:sp>
         </mc:Choice>
-        <mc:Fallback>
+        <mc:Fallback xmlns="">
           <p:sp>
             <p:nvSpPr>
               <p:cNvPr id="3" name="Content Placeholder 2"/>

</xml_diff>

<commit_message>
fixed typos in L8.1 and L8.3 per Will
</commit_message>
<xml_diff>
--- a/Slides/Lesson 8.1 Introducing General Recursion.pptx
+++ b/Slides/Lesson 8.1 Introducing General Recursion.pptx
@@ -313,7 +313,7 @@
             <a:fld id="{CF8F25F6-E1EF-4065-8525-42EDEBD9BD22}" type="datetimeFigureOut">
               <a:rPr lang="en-US" smtClean="0"/>
               <a:pPr/>
-              <a:t>10/22/2016</a:t>
+              <a:t>11/9/2016</a:t>
             </a:fld>
             <a:endParaRPr lang="en-US"/>
           </a:p>
@@ -2820,7 +2820,7 @@
           <a:p>
             <a:fld id="{2F1F79F5-7BEC-496A-AFC7-876E38F64D71}" type="datetime1">
               <a:rPr lang="en-US" smtClean="0"/>
-              <a:t>10/22/2016</a:t>
+              <a:t>11/9/2016</a:t>
             </a:fld>
             <a:endParaRPr lang="en-US"/>
           </a:p>
@@ -2915,7 +2915,7 @@
           <a:p>
             <a:fld id="{0A05703A-7669-4FEA-9056-25299B4D29D4}" type="datetime1">
               <a:rPr lang="en-US" smtClean="0"/>
-              <a:t>10/22/2016</a:t>
+              <a:t>11/9/2016</a:t>
             </a:fld>
             <a:endParaRPr lang="en-US"/>
           </a:p>
@@ -3190,7 +3190,7 @@
           <a:p>
             <a:fld id="{6E5077B5-BB57-49DB-88CA-226A139E5C01}" type="datetime1">
               <a:rPr lang="en-US" smtClean="0"/>
-              <a:t>10/22/2016</a:t>
+              <a:t>11/9/2016</a:t>
             </a:fld>
             <a:endParaRPr lang="en-US"/>
           </a:p>
@@ -3442,7 +3442,7 @@
           <a:p>
             <a:fld id="{C48D9447-CBD6-49A1-89FD-8512A8CF8999}" type="datetime1">
               <a:rPr lang="en-US" smtClean="0"/>
-              <a:t>10/22/2016</a:t>
+              <a:t>11/9/2016</a:t>
             </a:fld>
             <a:endParaRPr lang="en-US"/>
           </a:p>
@@ -3610,7 +3610,7 @@
           <a:p>
             <a:fld id="{A3639A2A-823D-48B7-9ACE-7FAF42870BA9}" type="datetime1">
               <a:rPr lang="en-US" smtClean="0"/>
-              <a:t>10/22/2016</a:t>
+              <a:t>11/9/2016</a:t>
             </a:fld>
             <a:endParaRPr lang="en-US"/>
           </a:p>
@@ -3788,7 +3788,7 @@
           <a:p>
             <a:fld id="{ED1B6996-82E9-463C-972C-7B56056E426C}" type="datetime1">
               <a:rPr lang="en-US" smtClean="0"/>
-              <a:t>10/22/2016</a:t>
+              <a:t>11/9/2016</a:t>
             </a:fld>
             <a:endParaRPr lang="en-US"/>
           </a:p>
@@ -3962,7 +3962,7 @@
           <a:p>
             <a:fld id="{E22ED4DA-448D-4BB1-B935-CC112220207B}" type="datetime1">
               <a:rPr lang="en-US" smtClean="0"/>
-              <a:t>10/22/2016</a:t>
+              <a:t>11/9/2016</a:t>
             </a:fld>
             <a:endParaRPr lang="en-US"/>
           </a:p>
@@ -4135,7 +4135,7 @@
           <a:p>
             <a:fld id="{E22ED4DA-448D-4BB1-B935-CC112220207B}" type="datetime1">
               <a:rPr lang="en-US" smtClean="0"/>
-              <a:t>10/22/2016</a:t>
+              <a:t>11/9/2016</a:t>
             </a:fld>
             <a:endParaRPr lang="en-US"/>
           </a:p>
@@ -4395,7 +4395,7 @@
           <a:p>
             <a:fld id="{FF5D65A6-AB94-4435-B0B7-3743215FA46C}" type="datetime1">
               <a:rPr lang="en-US" smtClean="0"/>
-              <a:t>10/22/2016</a:t>
+              <a:t>11/9/2016</a:t>
             </a:fld>
             <a:endParaRPr lang="en-US"/>
           </a:p>
@@ -4571,7 +4571,7 @@
           <a:p>
             <a:fld id="{FF5D65A6-AB94-4435-B0B7-3743215FA46C}" type="datetime1">
               <a:rPr lang="en-US" smtClean="0"/>
-              <a:t>10/22/2016</a:t>
+              <a:t>11/9/2016</a:t>
             </a:fld>
             <a:endParaRPr lang="en-US"/>
           </a:p>
@@ -4865,7 +4865,7 @@
           <a:p>
             <a:fld id="{7C193DC4-6EF0-48C9-B29C-616106A645E1}" type="datetime1">
               <a:rPr lang="en-US" smtClean="0"/>
-              <a:t>10/22/2016</a:t>
+              <a:t>11/9/2016</a:t>
             </a:fld>
             <a:endParaRPr lang="en-US"/>
           </a:p>
@@ -5150,7 +5150,7 @@
           <a:p>
             <a:fld id="{5D1846AD-9252-4647-9435-4C2AC365653A}" type="datetime1">
               <a:rPr lang="en-US" smtClean="0"/>
-              <a:t>10/22/2016</a:t>
+              <a:t>11/9/2016</a:t>
             </a:fld>
             <a:endParaRPr lang="en-US"/>
           </a:p>
@@ -5569,7 +5569,7 @@
           <a:p>
             <a:fld id="{CE56DC10-3561-4063-A6AF-C1CC7A41040A}" type="datetime1">
               <a:rPr lang="en-US" smtClean="0"/>
-              <a:t>10/22/2016</a:t>
+              <a:t>11/9/2016</a:t>
             </a:fld>
             <a:endParaRPr lang="en-US"/>
           </a:p>
@@ -5686,7 +5686,7 @@
           <a:p>
             <a:fld id="{2F7B77F5-1464-4F6B-92A8-64FC8A508293}" type="datetime1">
               <a:rPr lang="en-US" smtClean="0"/>
-              <a:t>10/22/2016</a:t>
+              <a:t>11/9/2016</a:t>
             </a:fld>
             <a:endParaRPr lang="en-US"/>
           </a:p>
@@ -5909,7 +5909,7 @@
           <a:p>
             <a:fld id="{02B3F677-983B-48DB-ADFD-63FE6CBC7FB2}" type="datetime1">
               <a:rPr lang="en-US" smtClean="0"/>
-              <a:t>10/22/2016</a:t>
+              <a:t>11/9/2016</a:t>
             </a:fld>
             <a:endParaRPr lang="en-US"/>
           </a:p>
@@ -13762,7 +13762,7 @@
                 </a:r>
                 <a:r>
                   <a:rPr lang="en-US" dirty="0"/>
-                  <a:t>This is better than an insertion sort, which takes </a:t>
+                  <a:t>This is better than a selection sort, which takes </a:t>
                 </a:r>
                 <a:r>
                   <a:rPr lang="en-US" b="1" dirty="0"/>

</xml_diff>